<commit_message>
Update Diagram in Chapter 6
</commit_message>
<xml_diff>
--- a/artifacts/CNTT_Artifact.pptx
+++ b/artifacts/CNTT_Artifact.pptx
@@ -6,7 +6,7 @@
     <p:sldMasterId id="2147483678" r:id="rId2"/>
   </p:sldMasterIdLst>
   <p:notesMasterIdLst>
-    <p:notesMasterId r:id="rId21"/>
+    <p:notesMasterId r:id="rId22"/>
   </p:notesMasterIdLst>
   <p:sldIdLst>
     <p:sldId id="256" r:id="rId3"/>
@@ -20,13 +20,14 @@
     <p:sldId id="265" r:id="rId11"/>
     <p:sldId id="266" r:id="rId12"/>
     <p:sldId id="271" r:id="rId13"/>
-    <p:sldId id="272" r:id="rId14"/>
-    <p:sldId id="273" r:id="rId15"/>
-    <p:sldId id="274" r:id="rId16"/>
-    <p:sldId id="275" r:id="rId17"/>
-    <p:sldId id="277" r:id="rId18"/>
-    <p:sldId id="280" r:id="rId19"/>
-    <p:sldId id="257" r:id="rId20"/>
+    <p:sldId id="281" r:id="rId14"/>
+    <p:sldId id="272" r:id="rId15"/>
+    <p:sldId id="273" r:id="rId16"/>
+    <p:sldId id="274" r:id="rId17"/>
+    <p:sldId id="275" r:id="rId18"/>
+    <p:sldId id="277" r:id="rId19"/>
+    <p:sldId id="280" r:id="rId20"/>
+    <p:sldId id="257" r:id="rId21"/>
   </p:sldIdLst>
   <p:sldSz cx="12192000" cy="6858000"/>
   <p:notesSz cx="6858000" cy="9144000"/>
@@ -215,7 +216,7 @@
           <a:p>
             <a:fld id="{F300692A-B8F2-48F6-B218-A4958D7E8758}" type="datetimeFigureOut">
               <a:rPr lang="en-US" smtClean="0"/>
-              <a:t>7/13/19</a:t>
+              <a:t>7/15/19</a:t>
             </a:fld>
             <a:endParaRPr lang="en-US"/>
           </a:p>
@@ -631,7 +632,7 @@
           <a:p>
             <a:fld id="{B32ABD91-820C-4FDF-A69B-FB4E2190F4FF}" type="slidenum">
               <a:rPr lang="en-US" smtClean="0"/>
-              <a:t>16</a:t>
+              <a:t>17</a:t>
             </a:fld>
             <a:endParaRPr lang="en-US"/>
           </a:p>
@@ -715,7 +716,7 @@
           <a:p>
             <a:fld id="{B32ABD91-820C-4FDF-A69B-FB4E2190F4FF}" type="slidenum">
               <a:rPr lang="en-US" smtClean="0"/>
-              <a:t>17</a:t>
+              <a:t>18</a:t>
             </a:fld>
             <a:endParaRPr lang="en-US"/>
           </a:p>
@@ -925,7 +926,7 @@
           <a:p>
             <a:fld id="{2B25DCB4-1894-45C1-AC80-BB1CC7AB7AF3}" type="datetimeFigureOut">
               <a:rPr lang="en-GB" smtClean="0"/>
-              <a:t>13/07/2019</a:t>
+              <a:t>15/07/2019</a:t>
             </a:fld>
             <a:endParaRPr lang="en-GB"/>
           </a:p>
@@ -1361,7 +1362,7 @@
           <a:p>
             <a:fld id="{2B25DCB4-1894-45C1-AC80-BB1CC7AB7AF3}" type="datetimeFigureOut">
               <a:rPr lang="en-GB" smtClean="0"/>
-              <a:t>13/07/2019</a:t>
+              <a:t>15/07/2019</a:t>
             </a:fld>
             <a:endParaRPr lang="en-GB"/>
           </a:p>
@@ -1611,7 +1612,7 @@
           <a:p>
             <a:fld id="{2B25DCB4-1894-45C1-AC80-BB1CC7AB7AF3}" type="datetimeFigureOut">
               <a:rPr lang="en-GB" smtClean="0"/>
-              <a:t>13/07/2019</a:t>
+              <a:t>15/07/2019</a:t>
             </a:fld>
             <a:endParaRPr lang="en-GB"/>
           </a:p>
@@ -1919,7 +1920,7 @@
           <a:p>
             <a:fld id="{2B25DCB4-1894-45C1-AC80-BB1CC7AB7AF3}" type="datetimeFigureOut">
               <a:rPr lang="en-GB" smtClean="0"/>
-              <a:t>13/07/2019</a:t>
+              <a:t>15/07/2019</a:t>
             </a:fld>
             <a:endParaRPr lang="en-GB"/>
           </a:p>
@@ -2237,7 +2238,7 @@
           <a:p>
             <a:fld id="{2B25DCB4-1894-45C1-AC80-BB1CC7AB7AF3}" type="datetimeFigureOut">
               <a:rPr lang="en-GB" smtClean="0"/>
-              <a:t>13/07/2019</a:t>
+              <a:t>15/07/2019</a:t>
             </a:fld>
             <a:endParaRPr lang="en-GB"/>
           </a:p>
@@ -2539,7 +2540,7 @@
           <a:p>
             <a:fld id="{2B25DCB4-1894-45C1-AC80-BB1CC7AB7AF3}" type="datetimeFigureOut">
               <a:rPr lang="en-GB" smtClean="0"/>
-              <a:t>13/07/2019</a:t>
+              <a:t>15/07/2019</a:t>
             </a:fld>
             <a:endParaRPr lang="en-GB"/>
           </a:p>
@@ -2906,7 +2907,7 @@
           <a:p>
             <a:fld id="{2B25DCB4-1894-45C1-AC80-BB1CC7AB7AF3}" type="datetimeFigureOut">
               <a:rPr lang="en-GB" smtClean="0"/>
-              <a:t>13/07/2019</a:t>
+              <a:t>15/07/2019</a:t>
             </a:fld>
             <a:endParaRPr lang="en-GB"/>
           </a:p>
@@ -3080,7 +3081,7 @@
           <a:p>
             <a:fld id="{2B25DCB4-1894-45C1-AC80-BB1CC7AB7AF3}" type="datetimeFigureOut">
               <a:rPr lang="en-GB" smtClean="0"/>
-              <a:t>13/07/2019</a:t>
+              <a:t>15/07/2019</a:t>
             </a:fld>
             <a:endParaRPr lang="en-GB"/>
           </a:p>
@@ -3260,7 +3261,7 @@
           <a:p>
             <a:fld id="{2B25DCB4-1894-45C1-AC80-BB1CC7AB7AF3}" type="datetimeFigureOut">
               <a:rPr lang="en-GB" smtClean="0"/>
-              <a:t>13/07/2019</a:t>
+              <a:t>15/07/2019</a:t>
             </a:fld>
             <a:endParaRPr lang="en-GB"/>
           </a:p>
@@ -3452,7 +3453,7 @@
           <a:p>
             <a:fld id="{432668E7-1494-4367-8917-840B541A68C2}" type="datetimeFigureOut">
               <a:rPr lang="en-GB" smtClean="0"/>
-              <a:t>13/07/2019</a:t>
+              <a:t>15/07/2019</a:t>
             </a:fld>
             <a:endParaRPr lang="en-GB"/>
           </a:p>
@@ -3622,7 +3623,7 @@
           <a:p>
             <a:fld id="{432668E7-1494-4367-8917-840B541A68C2}" type="datetimeFigureOut">
               <a:rPr lang="en-GB" smtClean="0"/>
-              <a:t>13/07/2019</a:t>
+              <a:t>15/07/2019</a:t>
             </a:fld>
             <a:endParaRPr lang="en-GB"/>
           </a:p>
@@ -3792,7 +3793,7 @@
           <a:p>
             <a:fld id="{2B25DCB4-1894-45C1-AC80-BB1CC7AB7AF3}" type="datetimeFigureOut">
               <a:rPr lang="en-GB" smtClean="0"/>
-              <a:t>13/07/2019</a:t>
+              <a:t>15/07/2019</a:t>
             </a:fld>
             <a:endParaRPr lang="en-GB"/>
           </a:p>
@@ -4038,7 +4039,7 @@
           <a:p>
             <a:fld id="{432668E7-1494-4367-8917-840B541A68C2}" type="datetimeFigureOut">
               <a:rPr lang="en-GB" smtClean="0"/>
-              <a:t>13/07/2019</a:t>
+              <a:t>15/07/2019</a:t>
             </a:fld>
             <a:endParaRPr lang="en-GB"/>
           </a:p>
@@ -4270,7 +4271,7 @@
           <a:p>
             <a:fld id="{432668E7-1494-4367-8917-840B541A68C2}" type="datetimeFigureOut">
               <a:rPr lang="en-GB" smtClean="0"/>
-              <a:t>13/07/2019</a:t>
+              <a:t>15/07/2019</a:t>
             </a:fld>
             <a:endParaRPr lang="en-GB"/>
           </a:p>
@@ -4637,7 +4638,7 @@
           <a:p>
             <a:fld id="{432668E7-1494-4367-8917-840B541A68C2}" type="datetimeFigureOut">
               <a:rPr lang="en-GB" smtClean="0"/>
-              <a:t>13/07/2019</a:t>
+              <a:t>15/07/2019</a:t>
             </a:fld>
             <a:endParaRPr lang="en-GB"/>
           </a:p>
@@ -4755,7 +4756,7 @@
           <a:p>
             <a:fld id="{432668E7-1494-4367-8917-840B541A68C2}" type="datetimeFigureOut">
               <a:rPr lang="en-GB" smtClean="0"/>
-              <a:t>13/07/2019</a:t>
+              <a:t>15/07/2019</a:t>
             </a:fld>
             <a:endParaRPr lang="en-GB"/>
           </a:p>
@@ -4850,7 +4851,7 @@
           <a:p>
             <a:fld id="{432668E7-1494-4367-8917-840B541A68C2}" type="datetimeFigureOut">
               <a:rPr lang="en-GB" smtClean="0"/>
-              <a:t>13/07/2019</a:t>
+              <a:t>15/07/2019</a:t>
             </a:fld>
             <a:endParaRPr lang="en-GB"/>
           </a:p>
@@ -5127,7 +5128,7 @@
           <a:p>
             <a:fld id="{432668E7-1494-4367-8917-840B541A68C2}" type="datetimeFigureOut">
               <a:rPr lang="en-GB" smtClean="0"/>
-              <a:t>13/07/2019</a:t>
+              <a:t>15/07/2019</a:t>
             </a:fld>
             <a:endParaRPr lang="en-GB"/>
           </a:p>
@@ -5380,7 +5381,7 @@
           <a:p>
             <a:fld id="{432668E7-1494-4367-8917-840B541A68C2}" type="datetimeFigureOut">
               <a:rPr lang="en-GB" smtClean="0"/>
-              <a:t>13/07/2019</a:t>
+              <a:t>15/07/2019</a:t>
             </a:fld>
             <a:endParaRPr lang="en-GB"/>
           </a:p>
@@ -5550,7 +5551,7 @@
           <a:p>
             <a:fld id="{432668E7-1494-4367-8917-840B541A68C2}" type="datetimeFigureOut">
               <a:rPr lang="en-GB" smtClean="0"/>
-              <a:t>13/07/2019</a:t>
+              <a:t>15/07/2019</a:t>
             </a:fld>
             <a:endParaRPr lang="en-GB"/>
           </a:p>
@@ -5730,7 +5731,7 @@
           <a:p>
             <a:fld id="{432668E7-1494-4367-8917-840B541A68C2}" type="datetimeFigureOut">
               <a:rPr lang="en-GB" smtClean="0"/>
-              <a:t>13/07/2019</a:t>
+              <a:t>15/07/2019</a:t>
             </a:fld>
             <a:endParaRPr lang="en-GB"/>
           </a:p>
@@ -5853,7 +5854,7 @@
           <a:p>
             <a:fld id="{AD47607F-D0CB-4AC6-9566-046428C59115}" type="datetime3">
               <a:rPr lang="en-US" smtClean="0"/>
-              <a:t>13 July 2019</a:t>
+              <a:t>15 July 2019</a:t>
             </a:fld>
             <a:endParaRPr lang="en-GB" dirty="0"/>
           </a:p>
@@ -6176,7 +6177,7 @@
           <a:p>
             <a:fld id="{2B25DCB4-1894-45C1-AC80-BB1CC7AB7AF3}" type="datetimeFigureOut">
               <a:rPr lang="en-GB" smtClean="0"/>
-              <a:t>13/07/2019</a:t>
+              <a:t>15/07/2019</a:t>
             </a:fld>
             <a:endParaRPr lang="en-GB"/>
           </a:p>
@@ -6679,7 +6680,7 @@
           <a:p>
             <a:fld id="{2B25DCB4-1894-45C1-AC80-BB1CC7AB7AF3}" type="datetimeFigureOut">
               <a:rPr lang="en-GB" smtClean="0"/>
-              <a:t>13/07/2019</a:t>
+              <a:t>15/07/2019</a:t>
             </a:fld>
             <a:endParaRPr lang="en-GB"/>
           </a:p>
@@ -7061,7 +7062,7 @@
           <a:p>
             <a:fld id="{2B25DCB4-1894-45C1-AC80-BB1CC7AB7AF3}" type="datetimeFigureOut">
               <a:rPr lang="en-GB" smtClean="0"/>
-              <a:t>13/07/2019</a:t>
+              <a:t>15/07/2019</a:t>
             </a:fld>
             <a:endParaRPr lang="en-GB"/>
           </a:p>
@@ -7179,7 +7180,7 @@
           <a:p>
             <a:fld id="{2B25DCB4-1894-45C1-AC80-BB1CC7AB7AF3}" type="datetimeFigureOut">
               <a:rPr lang="en-GB" smtClean="0"/>
-              <a:t>13/07/2019</a:t>
+              <a:t>15/07/2019</a:t>
             </a:fld>
             <a:endParaRPr lang="en-GB"/>
           </a:p>
@@ -7274,7 +7275,7 @@
           <a:p>
             <a:fld id="{2B25DCB4-1894-45C1-AC80-BB1CC7AB7AF3}" type="datetimeFigureOut">
               <a:rPr lang="en-GB" smtClean="0"/>
-              <a:t>13/07/2019</a:t>
+              <a:t>15/07/2019</a:t>
             </a:fld>
             <a:endParaRPr lang="en-GB"/>
           </a:p>
@@ -7529,7 +7530,7 @@
           <a:p>
             <a:fld id="{2B25DCB4-1894-45C1-AC80-BB1CC7AB7AF3}" type="datetimeFigureOut">
               <a:rPr lang="en-GB" smtClean="0"/>
-              <a:t>13/07/2019</a:t>
+              <a:t>15/07/2019</a:t>
             </a:fld>
             <a:endParaRPr lang="en-GB"/>
           </a:p>
@@ -7812,7 +7813,7 @@
           <a:p>
             <a:fld id="{2B25DCB4-1894-45C1-AC80-BB1CC7AB7AF3}" type="datetimeFigureOut">
               <a:rPr lang="en-GB" smtClean="0"/>
-              <a:t>13/07/2019</a:t>
+              <a:t>15/07/2019</a:t>
             </a:fld>
             <a:endParaRPr lang="en-GB"/>
           </a:p>
@@ -8218,7 +8219,7 @@
           <a:p>
             <a:fld id="{2B25DCB4-1894-45C1-AC80-BB1CC7AB7AF3}" type="datetimeFigureOut">
               <a:rPr lang="en-GB" smtClean="0"/>
-              <a:t>13/07/2019</a:t>
+              <a:t>15/07/2019</a:t>
             </a:fld>
             <a:endParaRPr lang="en-GB"/>
           </a:p>
@@ -8930,7 +8931,7 @@
           <a:p>
             <a:fld id="{432668E7-1494-4367-8917-840B541A68C2}" type="datetimeFigureOut">
               <a:rPr lang="en-GB" smtClean="0"/>
-              <a:t>13/07/2019</a:t>
+              <a:t>15/07/2019</a:t>
             </a:fld>
             <a:endParaRPr lang="en-GB"/>
           </a:p>
@@ -14894,6 +14895,2541 @@
           <a:chExt cx="0" cy="0"/>
         </a:xfrm>
       </p:grpSpPr>
+      <p:sp>
+        <p:nvSpPr>
+          <p:cNvPr id="118" name="Title 5"/>
+          <p:cNvSpPr txBox="1">
+            <a:spLocks/>
+          </p:cNvSpPr>
+          <p:nvPr/>
+        </p:nvSpPr>
+        <p:spPr>
+          <a:xfrm>
+            <a:off x="436082" y="483783"/>
+            <a:ext cx="9963149" cy="585227"/>
+          </a:xfrm>
+        </p:spPr>
+        <p:txBody>
+          <a:bodyPr>
+            <a:noAutofit/>
+          </a:bodyPr>
+          <a:lstStyle>
+            <a:lvl1pPr algn="l" defTabSz="914400" rtl="0" eaLnBrk="1" latinLnBrk="0" hangingPunct="1">
+              <a:spcBef>
+                <a:spcPct val="0"/>
+              </a:spcBef>
+              <a:buNone/>
+              <a:defRPr sz="2000" b="1" kern="1200">
+                <a:solidFill>
+                  <a:schemeClr val="tx1"/>
+                </a:solidFill>
+                <a:latin typeface="Arial" panose="020B0604020202020204" pitchFamily="34" charset="0"/>
+                <a:ea typeface="+mj-ea"/>
+                <a:cs typeface="Arial" panose="020B0604020202020204" pitchFamily="34" charset="0"/>
+              </a:defRPr>
+            </a:lvl1pPr>
+          </a:lstStyle>
+          <a:p>
+            <a:r>
+              <a:rPr lang="en-GB" sz="2667" b="0" dirty="0"/>
+              <a:t>CNTT</a:t>
+            </a:r>
+            <a:r>
+              <a:rPr lang="en-US" sz="2667" b="0" dirty="0"/>
+              <a:t> </a:t>
+            </a:r>
+            <a:r>
+              <a:rPr lang="en-GB" sz="2667" b="0" dirty="0">
+                <a:solidFill>
+                  <a:schemeClr val="bg1">
+                    <a:lumMod val="50000"/>
+                  </a:schemeClr>
+                </a:solidFill>
+              </a:rPr>
+              <a:t>| HW/SW </a:t>
+            </a:r>
+            <a:r>
+              <a:rPr lang="en-GB" sz="2667" b="0" dirty="0" err="1">
+                <a:solidFill>
+                  <a:schemeClr val="bg1">
+                    <a:lumMod val="50000"/>
+                  </a:schemeClr>
+                </a:solidFill>
+              </a:rPr>
+              <a:t>Config</a:t>
+            </a:r>
+            <a:r>
+              <a:rPr lang="en-GB" sz="2667" b="0" dirty="0">
+                <a:solidFill>
+                  <a:schemeClr val="bg1">
+                    <a:lumMod val="50000"/>
+                  </a:schemeClr>
+                </a:solidFill>
+              </a:rPr>
+              <a:t>. </a:t>
+            </a:r>
+          </a:p>
+        </p:txBody>
+      </p:sp>
+      <p:grpSp>
+        <p:nvGrpSpPr>
+          <p:cNvPr id="2" name="Group 1">
+            <a:extLst>
+              <a:ext uri="{FF2B5EF4-FFF2-40B4-BE49-F238E27FC236}">
+                <a16:creationId xmlns:a16="http://schemas.microsoft.com/office/drawing/2014/main" id="{3B33AA89-38A2-C849-9795-50F826E5A891}"/>
+              </a:ext>
+            </a:extLst>
+          </p:cNvPr>
+          <p:cNvGrpSpPr/>
+          <p:nvPr/>
+        </p:nvGrpSpPr>
+        <p:grpSpPr>
+          <a:xfrm>
+            <a:off x="2066906" y="4224766"/>
+            <a:ext cx="2570765" cy="1864939"/>
+            <a:chOff x="2066906" y="4224766"/>
+            <a:chExt cx="2570765" cy="1864939"/>
+          </a:xfrm>
+        </p:grpSpPr>
+        <p:sp>
+          <p:nvSpPr>
+            <p:cNvPr id="87" name="Rounded Rectangle 86"/>
+            <p:cNvSpPr/>
+            <p:nvPr/>
+          </p:nvSpPr>
+          <p:spPr>
+            <a:xfrm>
+              <a:off x="2066906" y="4361513"/>
+              <a:ext cx="2498757" cy="1728192"/>
+            </a:xfrm>
+            <a:prstGeom prst="roundRect">
+              <a:avLst>
+                <a:gd name="adj" fmla="val 7505"/>
+              </a:avLst>
+            </a:prstGeom>
+            <a:solidFill>
+              <a:srgbClr val="5C5C5C">
+                <a:alpha val="50000"/>
+              </a:srgbClr>
+            </a:solidFill>
+            <a:ln>
+              <a:noFill/>
+            </a:ln>
+            <a:effectLst/>
+          </p:spPr>
+          <p:txBody>
+            <a:bodyPr rtlCol="0" anchor="t"/>
+            <a:lstStyle/>
+            <a:p>
+              <a:pPr marL="0" marR="0" lvl="0" indent="0" algn="ctr" defTabSz="914400" eaLnBrk="1" fontAlgn="auto" latinLnBrk="0" hangingPunct="1">
+                <a:lnSpc>
+                  <a:spcPct val="100000"/>
+                </a:lnSpc>
+                <a:spcBef>
+                  <a:spcPts val="0"/>
+                </a:spcBef>
+                <a:spcAft>
+                  <a:spcPts val="0"/>
+                </a:spcAft>
+                <a:buClrTx/>
+                <a:buSzTx/>
+                <a:buFontTx/>
+                <a:buNone/>
+                <a:tabLst/>
+                <a:defRPr/>
+              </a:pPr>
+              <a:r>
+                <a:rPr kumimoji="0" lang="en-GB" sz="1400" b="1" i="0" u="none" strike="noStrike" kern="0" cap="none" spc="0" normalizeH="0" baseline="0" noProof="0" dirty="0">
+                  <a:ln>
+                    <a:noFill/>
+                  </a:ln>
+                  <a:solidFill>
+                    <a:srgbClr val="FFFFFF"/>
+                  </a:solidFill>
+                  <a:effectLst/>
+                  <a:uLnTx/>
+                  <a:uFillTx/>
+                  <a:latin typeface="Arial"/>
+                  <a:ea typeface="+mn-ea"/>
+                  <a:cs typeface="+mn-cs"/>
+                </a:rPr>
+                <a:t>Basic</a:t>
+              </a:r>
+            </a:p>
+          </p:txBody>
+        </p:sp>
+        <p:pic>
+          <p:nvPicPr>
+            <p:cNvPr id="88" name="Picture 87"/>
+            <p:cNvPicPr>
+              <a:picLocks noChangeAspect="1"/>
+            </p:cNvPicPr>
+            <p:nvPr/>
+          </p:nvPicPr>
+          <p:blipFill>
+            <a:blip r:embed="rId2" cstate="print">
+              <a:extLst>
+                <a:ext uri="{28A0092B-C50C-407E-A947-70E740481C1C}">
+                  <a14:useLocalDpi xmlns:a14="http://schemas.microsoft.com/office/drawing/2010/main" val="0"/>
+                </a:ext>
+              </a:extLst>
+            </a:blip>
+            <a:stretch>
+              <a:fillRect/>
+            </a:stretch>
+          </p:blipFill>
+          <p:spPr>
+            <a:xfrm>
+              <a:off x="4193792" y="4224766"/>
+              <a:ext cx="443879" cy="438637"/>
+            </a:xfrm>
+            <a:prstGeom prst="rect">
+              <a:avLst/>
+            </a:prstGeom>
+          </p:spPr>
+        </p:pic>
+        <p:sp>
+          <p:nvSpPr>
+            <p:cNvPr id="94" name="Rounded Rectangle 93"/>
+            <p:cNvSpPr/>
+            <p:nvPr/>
+          </p:nvSpPr>
+          <p:spPr>
+            <a:xfrm>
+              <a:off x="2138914" y="5420921"/>
+              <a:ext cx="1152128" cy="288032"/>
+            </a:xfrm>
+            <a:prstGeom prst="roundRect">
+              <a:avLst/>
+            </a:prstGeom>
+            <a:solidFill>
+              <a:srgbClr val="FCDF9E"/>
+            </a:solidFill>
+            <a:ln w="25400" cap="flat" cmpd="sng" algn="ctr">
+              <a:noFill/>
+              <a:prstDash val="solid"/>
+            </a:ln>
+            <a:effectLst/>
+          </p:spPr>
+          <p:txBody>
+            <a:bodyPr rtlCol="0" anchor="ctr"/>
+            <a:lstStyle/>
+            <a:p>
+              <a:pPr marL="0" marR="0" lvl="0" indent="0" algn="ctr" defTabSz="914400" eaLnBrk="1" fontAlgn="auto" latinLnBrk="0" hangingPunct="1">
+                <a:lnSpc>
+                  <a:spcPct val="100000"/>
+                </a:lnSpc>
+                <a:spcBef>
+                  <a:spcPts val="0"/>
+                </a:spcBef>
+                <a:spcAft>
+                  <a:spcPts val="0"/>
+                </a:spcAft>
+                <a:buClrTx/>
+                <a:buSzTx/>
+                <a:buFontTx/>
+                <a:buNone/>
+                <a:tabLst/>
+                <a:defRPr/>
+              </a:pPr>
+              <a:r>
+                <a:rPr kumimoji="0" lang="en-GB" sz="1200" b="0" i="0" u="none" strike="noStrike" kern="0" cap="none" spc="0" normalizeH="0" baseline="0" noProof="0" dirty="0">
+                  <a:ln>
+                    <a:noFill/>
+                  </a:ln>
+                  <a:solidFill>
+                    <a:srgbClr val="262626"/>
+                  </a:solidFill>
+                  <a:effectLst/>
+                  <a:uLnTx/>
+                  <a:uFillTx/>
+                  <a:latin typeface="Arial"/>
+                  <a:ea typeface="+mn-ea"/>
+                  <a:cs typeface="+mn-cs"/>
+                </a:rPr>
+                <a:t>SMT/HT</a:t>
+              </a:r>
+            </a:p>
+          </p:txBody>
+        </p:sp>
+        <p:sp>
+          <p:nvSpPr>
+            <p:cNvPr id="95" name="Rounded Rectangle 94"/>
+            <p:cNvSpPr/>
+            <p:nvPr/>
+          </p:nvSpPr>
+          <p:spPr>
+            <a:xfrm>
+              <a:off x="3352288" y="5420921"/>
+              <a:ext cx="1152128" cy="288032"/>
+            </a:xfrm>
+            <a:prstGeom prst="roundRect">
+              <a:avLst/>
+            </a:prstGeom>
+            <a:solidFill>
+              <a:srgbClr val="FCDF9E"/>
+            </a:solidFill>
+            <a:ln w="25400" cap="flat" cmpd="sng" algn="ctr">
+              <a:noFill/>
+              <a:prstDash val="solid"/>
+            </a:ln>
+            <a:effectLst/>
+          </p:spPr>
+          <p:txBody>
+            <a:bodyPr rtlCol="0" anchor="ctr"/>
+            <a:lstStyle/>
+            <a:p>
+              <a:pPr marL="0" marR="0" lvl="0" indent="0" algn="ctr" defTabSz="914400" eaLnBrk="1" fontAlgn="auto" latinLnBrk="0" hangingPunct="1">
+                <a:lnSpc>
+                  <a:spcPct val="100000"/>
+                </a:lnSpc>
+                <a:spcBef>
+                  <a:spcPts val="0"/>
+                </a:spcBef>
+                <a:spcAft>
+                  <a:spcPts val="0"/>
+                </a:spcAft>
+                <a:buClrTx/>
+                <a:buSzTx/>
+                <a:buFontTx/>
+                <a:buNone/>
+                <a:tabLst/>
+                <a:defRPr/>
+              </a:pPr>
+              <a:r>
+                <a:rPr lang="en-GB" sz="1200" kern="0" dirty="0">
+                  <a:solidFill>
+                    <a:srgbClr val="262626"/>
+                  </a:solidFill>
+                  <a:latin typeface="Arial"/>
+                </a:rPr>
+                <a:t>PCIe</a:t>
+              </a:r>
+              <a:endParaRPr kumimoji="0" lang="en-GB" sz="1200" b="0" i="0" u="none" strike="noStrike" kern="0" cap="none" spc="0" normalizeH="0" baseline="0" noProof="0" dirty="0">
+                <a:ln>
+                  <a:noFill/>
+                </a:ln>
+                <a:solidFill>
+                  <a:srgbClr val="262626"/>
+                </a:solidFill>
+                <a:effectLst/>
+                <a:uLnTx/>
+                <a:uFillTx/>
+                <a:latin typeface="Arial"/>
+                <a:ea typeface="+mn-ea"/>
+                <a:cs typeface="+mn-cs"/>
+              </a:endParaRPr>
+            </a:p>
+          </p:txBody>
+        </p:sp>
+        <p:sp>
+          <p:nvSpPr>
+            <p:cNvPr id="92" name="Rounded Rectangle 91"/>
+            <p:cNvSpPr/>
+            <p:nvPr/>
+          </p:nvSpPr>
+          <p:spPr>
+            <a:xfrm>
+              <a:off x="3352288" y="5080378"/>
+              <a:ext cx="1152128" cy="288032"/>
+            </a:xfrm>
+            <a:prstGeom prst="roundRect">
+              <a:avLst/>
+            </a:prstGeom>
+            <a:solidFill>
+              <a:srgbClr val="FCDF9E"/>
+            </a:solidFill>
+            <a:ln w="25400" cap="flat" cmpd="sng" algn="ctr">
+              <a:noFill/>
+              <a:prstDash val="solid"/>
+            </a:ln>
+            <a:effectLst/>
+          </p:spPr>
+          <p:txBody>
+            <a:bodyPr rtlCol="0" anchor="ctr"/>
+            <a:lstStyle/>
+            <a:p>
+              <a:pPr marL="0" marR="0" lvl="0" indent="0" algn="ctr" defTabSz="914400" eaLnBrk="1" fontAlgn="auto" latinLnBrk="0" hangingPunct="1">
+                <a:lnSpc>
+                  <a:spcPct val="100000"/>
+                </a:lnSpc>
+                <a:spcBef>
+                  <a:spcPts val="0"/>
+                </a:spcBef>
+                <a:spcAft>
+                  <a:spcPts val="0"/>
+                </a:spcAft>
+                <a:buClrTx/>
+                <a:buSzTx/>
+                <a:buFontTx/>
+                <a:buNone/>
+                <a:tabLst/>
+                <a:defRPr/>
+              </a:pPr>
+              <a:r>
+                <a:rPr lang="en-GB" sz="1200" kern="0" dirty="0">
+                  <a:solidFill>
+                    <a:srgbClr val="262626"/>
+                  </a:solidFill>
+                  <a:latin typeface="Arial"/>
+                </a:rPr>
+                <a:t>#NIC</a:t>
+              </a:r>
+              <a:endParaRPr kumimoji="0" lang="en-GB" sz="1200" b="0" i="0" u="none" strike="noStrike" kern="0" cap="none" spc="0" normalizeH="0" baseline="0" noProof="0" dirty="0">
+                <a:ln>
+                  <a:noFill/>
+                </a:ln>
+                <a:solidFill>
+                  <a:srgbClr val="262626"/>
+                </a:solidFill>
+                <a:effectLst/>
+                <a:uLnTx/>
+                <a:uFillTx/>
+                <a:latin typeface="Arial"/>
+                <a:ea typeface="+mn-ea"/>
+                <a:cs typeface="+mn-cs"/>
+              </a:endParaRPr>
+            </a:p>
+          </p:txBody>
+        </p:sp>
+        <p:sp>
+          <p:nvSpPr>
+            <p:cNvPr id="93" name="Rounded Rectangle 92"/>
+            <p:cNvSpPr/>
+            <p:nvPr/>
+          </p:nvSpPr>
+          <p:spPr>
+            <a:xfrm>
+              <a:off x="3364628" y="4737575"/>
+              <a:ext cx="1152128" cy="288032"/>
+            </a:xfrm>
+            <a:prstGeom prst="roundRect">
+              <a:avLst/>
+            </a:prstGeom>
+            <a:solidFill>
+              <a:srgbClr val="FCDF9E"/>
+            </a:solidFill>
+            <a:ln w="25400" cap="flat" cmpd="sng" algn="ctr">
+              <a:noFill/>
+              <a:prstDash val="solid"/>
+            </a:ln>
+            <a:effectLst/>
+          </p:spPr>
+          <p:txBody>
+            <a:bodyPr rtlCol="0" anchor="ctr"/>
+            <a:lstStyle/>
+            <a:p>
+              <a:pPr marL="0" marR="0" lvl="0" indent="0" algn="ctr" defTabSz="914400" eaLnBrk="1" fontAlgn="auto" latinLnBrk="0" hangingPunct="1">
+                <a:lnSpc>
+                  <a:spcPct val="100000"/>
+                </a:lnSpc>
+                <a:spcBef>
+                  <a:spcPts val="0"/>
+                </a:spcBef>
+                <a:spcAft>
+                  <a:spcPts val="0"/>
+                </a:spcAft>
+                <a:buClrTx/>
+                <a:buSzTx/>
+                <a:buFontTx/>
+                <a:buNone/>
+                <a:tabLst/>
+                <a:defRPr/>
+              </a:pPr>
+              <a:r>
+                <a:rPr kumimoji="0" lang="en-GB" sz="1200" b="0" i="0" u="none" strike="noStrike" kern="0" cap="none" spc="0" normalizeH="0" baseline="0" noProof="0" dirty="0">
+                  <a:ln>
+                    <a:noFill/>
+                  </a:ln>
+                  <a:solidFill>
+                    <a:srgbClr val="262626"/>
+                  </a:solidFill>
+                  <a:effectLst/>
+                  <a:uLnTx/>
+                  <a:uFillTx/>
+                  <a:latin typeface="Arial"/>
+                  <a:ea typeface="+mn-ea"/>
+                  <a:cs typeface="+mn-cs"/>
+                </a:rPr>
+                <a:t>SSD </a:t>
+              </a:r>
+            </a:p>
+          </p:txBody>
+        </p:sp>
+        <p:sp>
+          <p:nvSpPr>
+            <p:cNvPr id="60" name="Rounded Rectangle 59">
+              <a:extLst>
+                <a:ext uri="{FF2B5EF4-FFF2-40B4-BE49-F238E27FC236}">
+                  <a16:creationId xmlns:a16="http://schemas.microsoft.com/office/drawing/2014/main" id="{FCE20A78-67DB-CB4F-BCC4-0D61B1DD5052}"/>
+                </a:ext>
+              </a:extLst>
+            </p:cNvPr>
+            <p:cNvSpPr/>
+            <p:nvPr/>
+          </p:nvSpPr>
+          <p:spPr>
+            <a:xfrm>
+              <a:off x="2138914" y="5772811"/>
+              <a:ext cx="1152128" cy="288032"/>
+            </a:xfrm>
+            <a:prstGeom prst="roundRect">
+              <a:avLst/>
+            </a:prstGeom>
+            <a:solidFill>
+              <a:srgbClr val="FCDF9E"/>
+            </a:solidFill>
+            <a:ln w="25400" cap="flat" cmpd="sng" algn="ctr">
+              <a:noFill/>
+              <a:prstDash val="solid"/>
+            </a:ln>
+            <a:effectLst/>
+          </p:spPr>
+          <p:txBody>
+            <a:bodyPr rtlCol="0" anchor="ctr"/>
+            <a:lstStyle/>
+            <a:p>
+              <a:pPr marL="0" marR="0" lvl="0" indent="0" algn="ctr" defTabSz="914400" eaLnBrk="1" fontAlgn="auto" latinLnBrk="0" hangingPunct="1">
+                <a:lnSpc>
+                  <a:spcPct val="100000"/>
+                </a:lnSpc>
+                <a:spcBef>
+                  <a:spcPts val="0"/>
+                </a:spcBef>
+                <a:spcAft>
+                  <a:spcPts val="0"/>
+                </a:spcAft>
+                <a:buClrTx/>
+                <a:buSzTx/>
+                <a:buFontTx/>
+                <a:buNone/>
+                <a:tabLst/>
+                <a:defRPr/>
+              </a:pPr>
+              <a:r>
+                <a:rPr kumimoji="0" lang="en-GB" sz="1200" b="0" i="0" u="none" strike="noStrike" kern="0" cap="none" spc="0" normalizeH="0" baseline="0" noProof="0" dirty="0">
+                  <a:ln>
+                    <a:noFill/>
+                  </a:ln>
+                  <a:solidFill>
+                    <a:srgbClr val="262626"/>
+                  </a:solidFill>
+                  <a:effectLst/>
+                  <a:uLnTx/>
+                  <a:uFillTx/>
+                  <a:latin typeface="Arial"/>
+                  <a:ea typeface="+mn-ea"/>
+                  <a:cs typeface="+mn-cs"/>
+                </a:rPr>
+                <a:t>#CPU</a:t>
+              </a:r>
+            </a:p>
+          </p:txBody>
+        </p:sp>
+        <p:sp>
+          <p:nvSpPr>
+            <p:cNvPr id="61" name="Rounded Rectangle 60">
+              <a:extLst>
+                <a:ext uri="{FF2B5EF4-FFF2-40B4-BE49-F238E27FC236}">
+                  <a16:creationId xmlns:a16="http://schemas.microsoft.com/office/drawing/2014/main" id="{77B8E8C5-2974-0F4A-ABA3-D18A85195AEA}"/>
+                </a:ext>
+              </a:extLst>
+            </p:cNvPr>
+            <p:cNvSpPr/>
+            <p:nvPr/>
+          </p:nvSpPr>
+          <p:spPr>
+            <a:xfrm>
+              <a:off x="3352288" y="5761464"/>
+              <a:ext cx="1152128" cy="288032"/>
+            </a:xfrm>
+            <a:prstGeom prst="roundRect">
+              <a:avLst/>
+            </a:prstGeom>
+            <a:solidFill>
+              <a:srgbClr val="FCDF9E"/>
+            </a:solidFill>
+            <a:ln w="25400" cap="flat" cmpd="sng" algn="ctr">
+              <a:noFill/>
+              <a:prstDash val="solid"/>
+            </a:ln>
+            <a:effectLst/>
+          </p:spPr>
+          <p:txBody>
+            <a:bodyPr rtlCol="0" anchor="ctr"/>
+            <a:lstStyle/>
+            <a:p>
+              <a:pPr marL="0" marR="0" lvl="0" indent="0" algn="ctr" defTabSz="914400" eaLnBrk="1" fontAlgn="auto" latinLnBrk="0" hangingPunct="1">
+                <a:lnSpc>
+                  <a:spcPct val="100000"/>
+                </a:lnSpc>
+                <a:spcBef>
+                  <a:spcPts val="0"/>
+                </a:spcBef>
+                <a:spcAft>
+                  <a:spcPts val="0"/>
+                </a:spcAft>
+                <a:buClrTx/>
+                <a:buSzTx/>
+                <a:buFontTx/>
+                <a:buNone/>
+                <a:tabLst/>
+                <a:defRPr/>
+              </a:pPr>
+              <a:r>
+                <a:rPr kumimoji="0" lang="en-GB" sz="1200" b="0" i="0" u="none" strike="noStrike" kern="0" cap="none" spc="0" normalizeH="0" baseline="0" noProof="0" dirty="0">
+                  <a:ln>
+                    <a:noFill/>
+                  </a:ln>
+                  <a:solidFill>
+                    <a:srgbClr val="262626"/>
+                  </a:solidFill>
+                  <a:effectLst/>
+                  <a:uLnTx/>
+                  <a:uFillTx/>
+                  <a:latin typeface="Arial"/>
+                  <a:ea typeface="+mn-ea"/>
+                  <a:cs typeface="+mn-cs"/>
+                </a:rPr>
+                <a:t>#Cores</a:t>
+              </a:r>
+            </a:p>
+          </p:txBody>
+        </p:sp>
+        <p:sp>
+          <p:nvSpPr>
+            <p:cNvPr id="62" name="Rounded Rectangle 61">
+              <a:extLst>
+                <a:ext uri="{FF2B5EF4-FFF2-40B4-BE49-F238E27FC236}">
+                  <a16:creationId xmlns:a16="http://schemas.microsoft.com/office/drawing/2014/main" id="{75C28481-EEA1-4445-965A-64837F942658}"/>
+                </a:ext>
+              </a:extLst>
+            </p:cNvPr>
+            <p:cNvSpPr/>
+            <p:nvPr/>
+          </p:nvSpPr>
+          <p:spPr>
+            <a:xfrm>
+              <a:off x="2138914" y="5085826"/>
+              <a:ext cx="1152128" cy="288032"/>
+            </a:xfrm>
+            <a:prstGeom prst="roundRect">
+              <a:avLst/>
+            </a:prstGeom>
+            <a:solidFill>
+              <a:srgbClr val="FCDF9E"/>
+            </a:solidFill>
+            <a:ln w="25400" cap="flat" cmpd="sng" algn="ctr">
+              <a:noFill/>
+              <a:prstDash val="solid"/>
+            </a:ln>
+            <a:effectLst/>
+          </p:spPr>
+          <p:txBody>
+            <a:bodyPr rtlCol="0" anchor="ctr"/>
+            <a:lstStyle/>
+            <a:p>
+              <a:pPr marL="0" marR="0" lvl="0" indent="0" algn="ctr" defTabSz="914400" eaLnBrk="1" fontAlgn="auto" latinLnBrk="0" hangingPunct="1">
+                <a:lnSpc>
+                  <a:spcPct val="100000"/>
+                </a:lnSpc>
+                <a:spcBef>
+                  <a:spcPts val="0"/>
+                </a:spcBef>
+                <a:spcAft>
+                  <a:spcPts val="0"/>
+                </a:spcAft>
+                <a:buClrTx/>
+                <a:buSzTx/>
+                <a:buFontTx/>
+                <a:buNone/>
+                <a:tabLst/>
+                <a:defRPr/>
+              </a:pPr>
+              <a:r>
+                <a:rPr kumimoji="0" lang="en-GB" sz="1200" b="0" i="0" u="none" strike="noStrike" kern="0" cap="none" spc="0" normalizeH="0" baseline="0" noProof="0" dirty="0">
+                  <a:ln>
+                    <a:noFill/>
+                  </a:ln>
+                  <a:solidFill>
+                    <a:srgbClr val="262626"/>
+                  </a:solidFill>
+                  <a:effectLst/>
+                  <a:uLnTx/>
+                  <a:uFillTx/>
+                  <a:latin typeface="Arial"/>
+                  <a:ea typeface="+mn-ea"/>
+                  <a:cs typeface="+mn-cs"/>
+                </a:rPr>
+                <a:t>RAM(GB)</a:t>
+              </a:r>
+            </a:p>
+          </p:txBody>
+        </p:sp>
+        <p:sp>
+          <p:nvSpPr>
+            <p:cNvPr id="63" name="Rounded Rectangle 62">
+              <a:extLst>
+                <a:ext uri="{FF2B5EF4-FFF2-40B4-BE49-F238E27FC236}">
+                  <a16:creationId xmlns:a16="http://schemas.microsoft.com/office/drawing/2014/main" id="{4F48FC36-C931-254A-A435-8400516180A7}"/>
+                </a:ext>
+              </a:extLst>
+            </p:cNvPr>
+            <p:cNvSpPr/>
+            <p:nvPr/>
+          </p:nvSpPr>
+          <p:spPr>
+            <a:xfrm>
+              <a:off x="2138914" y="4745371"/>
+              <a:ext cx="1152128" cy="288032"/>
+            </a:xfrm>
+            <a:prstGeom prst="roundRect">
+              <a:avLst/>
+            </a:prstGeom>
+            <a:solidFill>
+              <a:srgbClr val="FCDF9E"/>
+            </a:solidFill>
+            <a:ln w="25400" cap="flat" cmpd="sng" algn="ctr">
+              <a:noFill/>
+              <a:prstDash val="solid"/>
+            </a:ln>
+            <a:effectLst/>
+          </p:spPr>
+          <p:txBody>
+            <a:bodyPr rtlCol="0" anchor="ctr"/>
+            <a:lstStyle/>
+            <a:p>
+              <a:pPr marL="0" marR="0" lvl="0" indent="0" algn="ctr" defTabSz="914400" eaLnBrk="1" fontAlgn="auto" latinLnBrk="0" hangingPunct="1">
+                <a:lnSpc>
+                  <a:spcPct val="100000"/>
+                </a:lnSpc>
+                <a:spcBef>
+                  <a:spcPts val="0"/>
+                </a:spcBef>
+                <a:spcAft>
+                  <a:spcPts val="0"/>
+                </a:spcAft>
+                <a:buClrTx/>
+                <a:buSzTx/>
+                <a:buFontTx/>
+                <a:buNone/>
+                <a:tabLst/>
+                <a:defRPr/>
+              </a:pPr>
+              <a:r>
+                <a:rPr lang="en-GB" sz="1200" kern="0" dirty="0">
+                  <a:solidFill>
+                    <a:srgbClr val="262626"/>
+                  </a:solidFill>
+                  <a:latin typeface="Arial"/>
+                </a:rPr>
+                <a:t>HD</a:t>
+              </a:r>
+              <a:r>
+                <a:rPr kumimoji="0" lang="en-GB" sz="1200" b="0" i="0" u="none" strike="noStrike" kern="0" cap="none" spc="0" normalizeH="0" baseline="0" noProof="0" dirty="0">
+                  <a:ln>
+                    <a:noFill/>
+                  </a:ln>
+                  <a:solidFill>
+                    <a:srgbClr val="262626"/>
+                  </a:solidFill>
+                  <a:effectLst/>
+                  <a:uLnTx/>
+                  <a:uFillTx/>
+                  <a:latin typeface="Arial"/>
+                  <a:ea typeface="+mn-ea"/>
+                  <a:cs typeface="+mn-cs"/>
+                </a:rPr>
+                <a:t>D </a:t>
+              </a:r>
+            </a:p>
+          </p:txBody>
+        </p:sp>
+      </p:grpSp>
+      <p:grpSp>
+        <p:nvGrpSpPr>
+          <p:cNvPr id="3" name="Group 2">
+            <a:extLst>
+              <a:ext uri="{FF2B5EF4-FFF2-40B4-BE49-F238E27FC236}">
+                <a16:creationId xmlns:a16="http://schemas.microsoft.com/office/drawing/2014/main" id="{59A0BDED-3F62-5444-B6A4-6B88B78AD869}"/>
+              </a:ext>
+            </a:extLst>
+          </p:cNvPr>
+          <p:cNvGrpSpPr/>
+          <p:nvPr/>
+        </p:nvGrpSpPr>
+        <p:grpSpPr>
+          <a:xfrm>
+            <a:off x="4810617" y="3855877"/>
+            <a:ext cx="2570765" cy="2233828"/>
+            <a:chOff x="4810617" y="3855877"/>
+            <a:chExt cx="2570765" cy="2233828"/>
+          </a:xfrm>
+        </p:grpSpPr>
+        <p:sp>
+          <p:nvSpPr>
+            <p:cNvPr id="66" name="Rounded Rectangle 65">
+              <a:extLst>
+                <a:ext uri="{FF2B5EF4-FFF2-40B4-BE49-F238E27FC236}">
+                  <a16:creationId xmlns:a16="http://schemas.microsoft.com/office/drawing/2014/main" id="{C79DA955-3DED-444E-95C6-D3E5BCB086A2}"/>
+                </a:ext>
+              </a:extLst>
+            </p:cNvPr>
+            <p:cNvSpPr/>
+            <p:nvPr/>
+          </p:nvSpPr>
+          <p:spPr>
+            <a:xfrm>
+              <a:off x="4810617" y="3986784"/>
+              <a:ext cx="2498757" cy="2102921"/>
+            </a:xfrm>
+            <a:prstGeom prst="roundRect">
+              <a:avLst>
+                <a:gd name="adj" fmla="val 7505"/>
+              </a:avLst>
+            </a:prstGeom>
+            <a:solidFill>
+              <a:srgbClr val="5C5C5C">
+                <a:alpha val="50000"/>
+              </a:srgbClr>
+            </a:solidFill>
+            <a:ln>
+              <a:noFill/>
+            </a:ln>
+            <a:effectLst/>
+          </p:spPr>
+          <p:txBody>
+            <a:bodyPr rtlCol="0" anchor="t"/>
+            <a:lstStyle/>
+            <a:p>
+              <a:pPr marL="0" marR="0" lvl="0" indent="0" algn="ctr" defTabSz="914400" eaLnBrk="1" fontAlgn="auto" latinLnBrk="0" hangingPunct="1">
+                <a:lnSpc>
+                  <a:spcPct val="100000"/>
+                </a:lnSpc>
+                <a:spcBef>
+                  <a:spcPts val="0"/>
+                </a:spcBef>
+                <a:spcAft>
+                  <a:spcPts val="0"/>
+                </a:spcAft>
+                <a:buClrTx/>
+                <a:buSzTx/>
+                <a:buFontTx/>
+                <a:buNone/>
+                <a:tabLst/>
+                <a:defRPr/>
+              </a:pPr>
+              <a:r>
+                <a:rPr kumimoji="0" lang="en-GB" sz="1400" b="1" i="0" u="none" strike="noStrike" kern="0" cap="none" spc="0" normalizeH="0" baseline="0" noProof="0" dirty="0">
+                  <a:ln>
+                    <a:noFill/>
+                  </a:ln>
+                  <a:solidFill>
+                    <a:srgbClr val="FFFFFF"/>
+                  </a:solidFill>
+                  <a:effectLst/>
+                  <a:uLnTx/>
+                  <a:uFillTx/>
+                  <a:latin typeface="Arial"/>
+                  <a:ea typeface="+mn-ea"/>
+                  <a:cs typeface="+mn-cs"/>
+                </a:rPr>
+                <a:t>Network Intensive</a:t>
+              </a:r>
+            </a:p>
+          </p:txBody>
+        </p:sp>
+        <p:pic>
+          <p:nvPicPr>
+            <p:cNvPr id="67" name="Picture 66">
+              <a:extLst>
+                <a:ext uri="{FF2B5EF4-FFF2-40B4-BE49-F238E27FC236}">
+                  <a16:creationId xmlns:a16="http://schemas.microsoft.com/office/drawing/2014/main" id="{1487D1C9-5B8E-4042-87DD-FE7A3ECDEA82}"/>
+                </a:ext>
+              </a:extLst>
+            </p:cNvPr>
+            <p:cNvPicPr>
+              <a:picLocks noChangeAspect="1"/>
+            </p:cNvPicPr>
+            <p:nvPr/>
+          </p:nvPicPr>
+          <p:blipFill>
+            <a:blip r:embed="rId2" cstate="print">
+              <a:extLst>
+                <a:ext uri="{28A0092B-C50C-407E-A947-70E740481C1C}">
+                  <a14:useLocalDpi xmlns:a14="http://schemas.microsoft.com/office/drawing/2010/main" val="0"/>
+                </a:ext>
+              </a:extLst>
+            </a:blip>
+            <a:stretch>
+              <a:fillRect/>
+            </a:stretch>
+          </p:blipFill>
+          <p:spPr>
+            <a:xfrm>
+              <a:off x="6937503" y="3855877"/>
+              <a:ext cx="443879" cy="438637"/>
+            </a:xfrm>
+            <a:prstGeom prst="rect">
+              <a:avLst/>
+            </a:prstGeom>
+          </p:spPr>
+        </p:pic>
+        <p:sp>
+          <p:nvSpPr>
+            <p:cNvPr id="68" name="Rounded Rectangle 67">
+              <a:extLst>
+                <a:ext uri="{FF2B5EF4-FFF2-40B4-BE49-F238E27FC236}">
+                  <a16:creationId xmlns:a16="http://schemas.microsoft.com/office/drawing/2014/main" id="{981604DF-FD30-4446-97ED-7BCBDE9BE014}"/>
+                </a:ext>
+              </a:extLst>
+            </p:cNvPr>
+            <p:cNvSpPr/>
+            <p:nvPr/>
+          </p:nvSpPr>
+          <p:spPr>
+            <a:xfrm>
+              <a:off x="4882625" y="5420921"/>
+              <a:ext cx="1152128" cy="288032"/>
+            </a:xfrm>
+            <a:prstGeom prst="roundRect">
+              <a:avLst/>
+            </a:prstGeom>
+            <a:solidFill>
+              <a:srgbClr val="FCDF9E"/>
+            </a:solidFill>
+            <a:ln w="25400" cap="flat" cmpd="sng" algn="ctr">
+              <a:noFill/>
+              <a:prstDash val="solid"/>
+            </a:ln>
+            <a:effectLst/>
+          </p:spPr>
+          <p:txBody>
+            <a:bodyPr rtlCol="0" anchor="ctr"/>
+            <a:lstStyle/>
+            <a:p>
+              <a:pPr marL="0" marR="0" lvl="0" indent="0" algn="ctr" defTabSz="914400" eaLnBrk="1" fontAlgn="auto" latinLnBrk="0" hangingPunct="1">
+                <a:lnSpc>
+                  <a:spcPct val="100000"/>
+                </a:lnSpc>
+                <a:spcBef>
+                  <a:spcPts val="0"/>
+                </a:spcBef>
+                <a:spcAft>
+                  <a:spcPts val="0"/>
+                </a:spcAft>
+                <a:buClrTx/>
+                <a:buSzTx/>
+                <a:buFontTx/>
+                <a:buNone/>
+                <a:tabLst/>
+                <a:defRPr/>
+              </a:pPr>
+              <a:r>
+                <a:rPr kumimoji="0" lang="en-GB" sz="1200" b="0" i="0" u="none" strike="noStrike" kern="0" cap="none" spc="0" normalizeH="0" baseline="0" noProof="0" dirty="0">
+                  <a:ln>
+                    <a:noFill/>
+                  </a:ln>
+                  <a:solidFill>
+                    <a:srgbClr val="262626"/>
+                  </a:solidFill>
+                  <a:effectLst/>
+                  <a:uLnTx/>
+                  <a:uFillTx/>
+                  <a:latin typeface="Arial"/>
+                  <a:ea typeface="+mn-ea"/>
+                  <a:cs typeface="+mn-cs"/>
+                </a:rPr>
+                <a:t>SMT/HT</a:t>
+              </a:r>
+            </a:p>
+          </p:txBody>
+        </p:sp>
+        <p:sp>
+          <p:nvSpPr>
+            <p:cNvPr id="69" name="Rounded Rectangle 68">
+              <a:extLst>
+                <a:ext uri="{FF2B5EF4-FFF2-40B4-BE49-F238E27FC236}">
+                  <a16:creationId xmlns:a16="http://schemas.microsoft.com/office/drawing/2014/main" id="{1912CF33-92C3-264D-B45D-30004C610AD5}"/>
+                </a:ext>
+              </a:extLst>
+            </p:cNvPr>
+            <p:cNvSpPr/>
+            <p:nvPr/>
+          </p:nvSpPr>
+          <p:spPr>
+            <a:xfrm>
+              <a:off x="6095999" y="5420921"/>
+              <a:ext cx="1152128" cy="288032"/>
+            </a:xfrm>
+            <a:prstGeom prst="roundRect">
+              <a:avLst/>
+            </a:prstGeom>
+            <a:solidFill>
+              <a:srgbClr val="FCDF9E"/>
+            </a:solidFill>
+            <a:ln w="25400" cap="flat" cmpd="sng" algn="ctr">
+              <a:noFill/>
+              <a:prstDash val="solid"/>
+            </a:ln>
+            <a:effectLst/>
+          </p:spPr>
+          <p:txBody>
+            <a:bodyPr rtlCol="0" anchor="ctr"/>
+            <a:lstStyle/>
+            <a:p>
+              <a:pPr marL="0" marR="0" lvl="0" indent="0" algn="ctr" defTabSz="914400" eaLnBrk="1" fontAlgn="auto" latinLnBrk="0" hangingPunct="1">
+                <a:lnSpc>
+                  <a:spcPct val="100000"/>
+                </a:lnSpc>
+                <a:spcBef>
+                  <a:spcPts val="0"/>
+                </a:spcBef>
+                <a:spcAft>
+                  <a:spcPts val="0"/>
+                </a:spcAft>
+                <a:buClrTx/>
+                <a:buSzTx/>
+                <a:buFontTx/>
+                <a:buNone/>
+                <a:tabLst/>
+                <a:defRPr/>
+              </a:pPr>
+              <a:r>
+                <a:rPr lang="en-GB" sz="1200" kern="0" dirty="0">
+                  <a:solidFill>
+                    <a:srgbClr val="262626"/>
+                  </a:solidFill>
+                  <a:latin typeface="Arial"/>
+                </a:rPr>
+                <a:t>PCIe</a:t>
+              </a:r>
+              <a:endParaRPr kumimoji="0" lang="en-GB" sz="1200" b="0" i="0" u="none" strike="noStrike" kern="0" cap="none" spc="0" normalizeH="0" baseline="0" noProof="0" dirty="0">
+                <a:ln>
+                  <a:noFill/>
+                </a:ln>
+                <a:solidFill>
+                  <a:srgbClr val="262626"/>
+                </a:solidFill>
+                <a:effectLst/>
+                <a:uLnTx/>
+                <a:uFillTx/>
+                <a:latin typeface="Arial"/>
+                <a:ea typeface="+mn-ea"/>
+                <a:cs typeface="+mn-cs"/>
+              </a:endParaRPr>
+            </a:p>
+          </p:txBody>
+        </p:sp>
+        <p:sp>
+          <p:nvSpPr>
+            <p:cNvPr id="70" name="Rounded Rectangle 69">
+              <a:extLst>
+                <a:ext uri="{FF2B5EF4-FFF2-40B4-BE49-F238E27FC236}">
+                  <a16:creationId xmlns:a16="http://schemas.microsoft.com/office/drawing/2014/main" id="{8728341C-1406-554A-A017-534D0EFEA987}"/>
+                </a:ext>
+              </a:extLst>
+            </p:cNvPr>
+            <p:cNvSpPr/>
+            <p:nvPr/>
+          </p:nvSpPr>
+          <p:spPr>
+            <a:xfrm>
+              <a:off x="6095999" y="5080378"/>
+              <a:ext cx="1152128" cy="288032"/>
+            </a:xfrm>
+            <a:prstGeom prst="roundRect">
+              <a:avLst/>
+            </a:prstGeom>
+            <a:solidFill>
+              <a:srgbClr val="FCDF9E"/>
+            </a:solidFill>
+            <a:ln w="25400" cap="flat" cmpd="sng" algn="ctr">
+              <a:noFill/>
+              <a:prstDash val="solid"/>
+            </a:ln>
+            <a:effectLst/>
+          </p:spPr>
+          <p:txBody>
+            <a:bodyPr rtlCol="0" anchor="ctr"/>
+            <a:lstStyle/>
+            <a:p>
+              <a:pPr marL="0" marR="0" lvl="0" indent="0" algn="ctr" defTabSz="914400" eaLnBrk="1" fontAlgn="auto" latinLnBrk="0" hangingPunct="1">
+                <a:lnSpc>
+                  <a:spcPct val="100000"/>
+                </a:lnSpc>
+                <a:spcBef>
+                  <a:spcPts val="0"/>
+                </a:spcBef>
+                <a:spcAft>
+                  <a:spcPts val="0"/>
+                </a:spcAft>
+                <a:buClrTx/>
+                <a:buSzTx/>
+                <a:buFontTx/>
+                <a:buNone/>
+                <a:tabLst/>
+                <a:defRPr/>
+              </a:pPr>
+              <a:r>
+                <a:rPr lang="en-GB" sz="1200" kern="0" dirty="0">
+                  <a:solidFill>
+                    <a:srgbClr val="262626"/>
+                  </a:solidFill>
+                  <a:latin typeface="Arial"/>
+                </a:rPr>
+                <a:t>#NIC</a:t>
+              </a:r>
+              <a:endParaRPr kumimoji="0" lang="en-GB" sz="1200" b="0" i="0" u="none" strike="noStrike" kern="0" cap="none" spc="0" normalizeH="0" baseline="0" noProof="0" dirty="0">
+                <a:ln>
+                  <a:noFill/>
+                </a:ln>
+                <a:solidFill>
+                  <a:srgbClr val="262626"/>
+                </a:solidFill>
+                <a:effectLst/>
+                <a:uLnTx/>
+                <a:uFillTx/>
+                <a:latin typeface="Arial"/>
+                <a:ea typeface="+mn-ea"/>
+                <a:cs typeface="+mn-cs"/>
+              </a:endParaRPr>
+            </a:p>
+          </p:txBody>
+        </p:sp>
+        <p:sp>
+          <p:nvSpPr>
+            <p:cNvPr id="71" name="Rounded Rectangle 70">
+              <a:extLst>
+                <a:ext uri="{FF2B5EF4-FFF2-40B4-BE49-F238E27FC236}">
+                  <a16:creationId xmlns:a16="http://schemas.microsoft.com/office/drawing/2014/main" id="{2CAE517E-708D-EB45-8DF1-F30B8CAC4473}"/>
+                </a:ext>
+              </a:extLst>
+            </p:cNvPr>
+            <p:cNvSpPr/>
+            <p:nvPr/>
+          </p:nvSpPr>
+          <p:spPr>
+            <a:xfrm>
+              <a:off x="6108339" y="4737575"/>
+              <a:ext cx="1152128" cy="288032"/>
+            </a:xfrm>
+            <a:prstGeom prst="roundRect">
+              <a:avLst/>
+            </a:prstGeom>
+            <a:solidFill>
+              <a:srgbClr val="FCDF9E"/>
+            </a:solidFill>
+            <a:ln w="25400" cap="flat" cmpd="sng" algn="ctr">
+              <a:noFill/>
+              <a:prstDash val="solid"/>
+            </a:ln>
+            <a:effectLst/>
+          </p:spPr>
+          <p:txBody>
+            <a:bodyPr rtlCol="0" anchor="ctr"/>
+            <a:lstStyle/>
+            <a:p>
+              <a:pPr marL="0" marR="0" lvl="0" indent="0" algn="ctr" defTabSz="914400" eaLnBrk="1" fontAlgn="auto" latinLnBrk="0" hangingPunct="1">
+                <a:lnSpc>
+                  <a:spcPct val="100000"/>
+                </a:lnSpc>
+                <a:spcBef>
+                  <a:spcPts val="0"/>
+                </a:spcBef>
+                <a:spcAft>
+                  <a:spcPts val="0"/>
+                </a:spcAft>
+                <a:buClrTx/>
+                <a:buSzTx/>
+                <a:buFontTx/>
+                <a:buNone/>
+                <a:tabLst/>
+                <a:defRPr/>
+              </a:pPr>
+              <a:r>
+                <a:rPr kumimoji="0" lang="en-GB" sz="1200" b="0" i="0" u="none" strike="noStrike" kern="0" cap="none" spc="0" normalizeH="0" baseline="0" noProof="0" dirty="0">
+                  <a:ln>
+                    <a:noFill/>
+                  </a:ln>
+                  <a:solidFill>
+                    <a:srgbClr val="262626"/>
+                  </a:solidFill>
+                  <a:effectLst/>
+                  <a:uLnTx/>
+                  <a:uFillTx/>
+                  <a:latin typeface="Arial"/>
+                  <a:ea typeface="+mn-ea"/>
+                  <a:cs typeface="+mn-cs"/>
+                </a:rPr>
+                <a:t>SSD </a:t>
+              </a:r>
+            </a:p>
+          </p:txBody>
+        </p:sp>
+        <p:sp>
+          <p:nvSpPr>
+            <p:cNvPr id="72" name="Rounded Rectangle 71">
+              <a:extLst>
+                <a:ext uri="{FF2B5EF4-FFF2-40B4-BE49-F238E27FC236}">
+                  <a16:creationId xmlns:a16="http://schemas.microsoft.com/office/drawing/2014/main" id="{EFB9D564-083E-4448-8F63-519E8374311B}"/>
+                </a:ext>
+              </a:extLst>
+            </p:cNvPr>
+            <p:cNvSpPr/>
+            <p:nvPr/>
+          </p:nvSpPr>
+          <p:spPr>
+            <a:xfrm>
+              <a:off x="4882625" y="5772811"/>
+              <a:ext cx="1152128" cy="288032"/>
+            </a:xfrm>
+            <a:prstGeom prst="roundRect">
+              <a:avLst/>
+            </a:prstGeom>
+            <a:solidFill>
+              <a:srgbClr val="FCDF9E"/>
+            </a:solidFill>
+            <a:ln w="25400" cap="flat" cmpd="sng" algn="ctr">
+              <a:noFill/>
+              <a:prstDash val="solid"/>
+            </a:ln>
+            <a:effectLst/>
+          </p:spPr>
+          <p:txBody>
+            <a:bodyPr rtlCol="0" anchor="ctr"/>
+            <a:lstStyle/>
+            <a:p>
+              <a:pPr marL="0" marR="0" lvl="0" indent="0" algn="ctr" defTabSz="914400" eaLnBrk="1" fontAlgn="auto" latinLnBrk="0" hangingPunct="1">
+                <a:lnSpc>
+                  <a:spcPct val="100000"/>
+                </a:lnSpc>
+                <a:spcBef>
+                  <a:spcPts val="0"/>
+                </a:spcBef>
+                <a:spcAft>
+                  <a:spcPts val="0"/>
+                </a:spcAft>
+                <a:buClrTx/>
+                <a:buSzTx/>
+                <a:buFontTx/>
+                <a:buNone/>
+                <a:tabLst/>
+                <a:defRPr/>
+              </a:pPr>
+              <a:r>
+                <a:rPr kumimoji="0" lang="en-GB" sz="1200" b="0" i="0" u="none" strike="noStrike" kern="0" cap="none" spc="0" normalizeH="0" baseline="0" noProof="0" dirty="0">
+                  <a:ln>
+                    <a:noFill/>
+                  </a:ln>
+                  <a:solidFill>
+                    <a:srgbClr val="262626"/>
+                  </a:solidFill>
+                  <a:effectLst/>
+                  <a:uLnTx/>
+                  <a:uFillTx/>
+                  <a:latin typeface="Arial"/>
+                  <a:ea typeface="+mn-ea"/>
+                  <a:cs typeface="+mn-cs"/>
+                </a:rPr>
+                <a:t>#CPU</a:t>
+              </a:r>
+            </a:p>
+          </p:txBody>
+        </p:sp>
+        <p:sp>
+          <p:nvSpPr>
+            <p:cNvPr id="73" name="Rounded Rectangle 72">
+              <a:extLst>
+                <a:ext uri="{FF2B5EF4-FFF2-40B4-BE49-F238E27FC236}">
+                  <a16:creationId xmlns:a16="http://schemas.microsoft.com/office/drawing/2014/main" id="{99B14DED-4CA0-3744-BA7D-3A9A68A80377}"/>
+                </a:ext>
+              </a:extLst>
+            </p:cNvPr>
+            <p:cNvSpPr/>
+            <p:nvPr/>
+          </p:nvSpPr>
+          <p:spPr>
+            <a:xfrm>
+              <a:off x="6095999" y="5761464"/>
+              <a:ext cx="1152128" cy="288032"/>
+            </a:xfrm>
+            <a:prstGeom prst="roundRect">
+              <a:avLst/>
+            </a:prstGeom>
+            <a:solidFill>
+              <a:srgbClr val="FCDF9E"/>
+            </a:solidFill>
+            <a:ln w="25400" cap="flat" cmpd="sng" algn="ctr">
+              <a:noFill/>
+              <a:prstDash val="solid"/>
+            </a:ln>
+            <a:effectLst/>
+          </p:spPr>
+          <p:txBody>
+            <a:bodyPr rtlCol="0" anchor="ctr"/>
+            <a:lstStyle/>
+            <a:p>
+              <a:pPr marL="0" marR="0" lvl="0" indent="0" algn="ctr" defTabSz="914400" eaLnBrk="1" fontAlgn="auto" latinLnBrk="0" hangingPunct="1">
+                <a:lnSpc>
+                  <a:spcPct val="100000"/>
+                </a:lnSpc>
+                <a:spcBef>
+                  <a:spcPts val="0"/>
+                </a:spcBef>
+                <a:spcAft>
+                  <a:spcPts val="0"/>
+                </a:spcAft>
+                <a:buClrTx/>
+                <a:buSzTx/>
+                <a:buFontTx/>
+                <a:buNone/>
+                <a:tabLst/>
+                <a:defRPr/>
+              </a:pPr>
+              <a:r>
+                <a:rPr kumimoji="0" lang="en-GB" sz="1200" b="0" i="0" u="none" strike="noStrike" kern="0" cap="none" spc="0" normalizeH="0" baseline="0" noProof="0" dirty="0">
+                  <a:ln>
+                    <a:noFill/>
+                  </a:ln>
+                  <a:solidFill>
+                    <a:srgbClr val="262626"/>
+                  </a:solidFill>
+                  <a:effectLst/>
+                  <a:uLnTx/>
+                  <a:uFillTx/>
+                  <a:latin typeface="Arial"/>
+                  <a:ea typeface="+mn-ea"/>
+                  <a:cs typeface="+mn-cs"/>
+                </a:rPr>
+                <a:t>#Cores</a:t>
+              </a:r>
+            </a:p>
+          </p:txBody>
+        </p:sp>
+        <p:sp>
+          <p:nvSpPr>
+            <p:cNvPr id="74" name="Rounded Rectangle 73">
+              <a:extLst>
+                <a:ext uri="{FF2B5EF4-FFF2-40B4-BE49-F238E27FC236}">
+                  <a16:creationId xmlns:a16="http://schemas.microsoft.com/office/drawing/2014/main" id="{B6A0704F-E967-4D43-92A0-CEC9CA788893}"/>
+                </a:ext>
+              </a:extLst>
+            </p:cNvPr>
+            <p:cNvSpPr/>
+            <p:nvPr/>
+          </p:nvSpPr>
+          <p:spPr>
+            <a:xfrm>
+              <a:off x="4882625" y="5085826"/>
+              <a:ext cx="1152128" cy="288032"/>
+            </a:xfrm>
+            <a:prstGeom prst="roundRect">
+              <a:avLst/>
+            </a:prstGeom>
+            <a:solidFill>
+              <a:srgbClr val="FCDF9E"/>
+            </a:solidFill>
+            <a:ln w="25400" cap="flat" cmpd="sng" algn="ctr">
+              <a:noFill/>
+              <a:prstDash val="solid"/>
+            </a:ln>
+            <a:effectLst/>
+          </p:spPr>
+          <p:txBody>
+            <a:bodyPr rtlCol="0" anchor="ctr"/>
+            <a:lstStyle/>
+            <a:p>
+              <a:pPr marL="0" marR="0" lvl="0" indent="0" algn="ctr" defTabSz="914400" eaLnBrk="1" fontAlgn="auto" latinLnBrk="0" hangingPunct="1">
+                <a:lnSpc>
+                  <a:spcPct val="100000"/>
+                </a:lnSpc>
+                <a:spcBef>
+                  <a:spcPts val="0"/>
+                </a:spcBef>
+                <a:spcAft>
+                  <a:spcPts val="0"/>
+                </a:spcAft>
+                <a:buClrTx/>
+                <a:buSzTx/>
+                <a:buFontTx/>
+                <a:buNone/>
+                <a:tabLst/>
+                <a:defRPr/>
+              </a:pPr>
+              <a:r>
+                <a:rPr kumimoji="0" lang="en-GB" sz="1200" b="0" i="0" u="none" strike="noStrike" kern="0" cap="none" spc="0" normalizeH="0" baseline="0" noProof="0" dirty="0">
+                  <a:ln>
+                    <a:noFill/>
+                  </a:ln>
+                  <a:solidFill>
+                    <a:srgbClr val="262626"/>
+                  </a:solidFill>
+                  <a:effectLst/>
+                  <a:uLnTx/>
+                  <a:uFillTx/>
+                  <a:latin typeface="Arial"/>
+                  <a:ea typeface="+mn-ea"/>
+                  <a:cs typeface="+mn-cs"/>
+                </a:rPr>
+                <a:t>RAM(GB)</a:t>
+              </a:r>
+            </a:p>
+          </p:txBody>
+        </p:sp>
+        <p:sp>
+          <p:nvSpPr>
+            <p:cNvPr id="75" name="Rounded Rectangle 74">
+              <a:extLst>
+                <a:ext uri="{FF2B5EF4-FFF2-40B4-BE49-F238E27FC236}">
+                  <a16:creationId xmlns:a16="http://schemas.microsoft.com/office/drawing/2014/main" id="{92B147EB-0033-B04A-A177-1A94733B58F2}"/>
+                </a:ext>
+              </a:extLst>
+            </p:cNvPr>
+            <p:cNvSpPr/>
+            <p:nvPr/>
+          </p:nvSpPr>
+          <p:spPr>
+            <a:xfrm>
+              <a:off x="4882625" y="4745371"/>
+              <a:ext cx="1152128" cy="288032"/>
+            </a:xfrm>
+            <a:prstGeom prst="roundRect">
+              <a:avLst/>
+            </a:prstGeom>
+            <a:solidFill>
+              <a:srgbClr val="FCDF9E"/>
+            </a:solidFill>
+            <a:ln w="25400" cap="flat" cmpd="sng" algn="ctr">
+              <a:noFill/>
+              <a:prstDash val="solid"/>
+            </a:ln>
+            <a:effectLst/>
+          </p:spPr>
+          <p:txBody>
+            <a:bodyPr rtlCol="0" anchor="ctr"/>
+            <a:lstStyle/>
+            <a:p>
+              <a:pPr marL="0" marR="0" lvl="0" indent="0" algn="ctr" defTabSz="914400" eaLnBrk="1" fontAlgn="auto" latinLnBrk="0" hangingPunct="1">
+                <a:lnSpc>
+                  <a:spcPct val="100000"/>
+                </a:lnSpc>
+                <a:spcBef>
+                  <a:spcPts val="0"/>
+                </a:spcBef>
+                <a:spcAft>
+                  <a:spcPts val="0"/>
+                </a:spcAft>
+                <a:buClrTx/>
+                <a:buSzTx/>
+                <a:buFontTx/>
+                <a:buNone/>
+                <a:tabLst/>
+                <a:defRPr/>
+              </a:pPr>
+              <a:r>
+                <a:rPr lang="en-GB" sz="1200" kern="0" dirty="0">
+                  <a:solidFill>
+                    <a:srgbClr val="262626"/>
+                  </a:solidFill>
+                  <a:latin typeface="Arial"/>
+                </a:rPr>
+                <a:t>HD</a:t>
+              </a:r>
+              <a:r>
+                <a:rPr kumimoji="0" lang="en-GB" sz="1200" b="0" i="0" u="none" strike="noStrike" kern="0" cap="none" spc="0" normalizeH="0" baseline="0" noProof="0" dirty="0">
+                  <a:ln>
+                    <a:noFill/>
+                  </a:ln>
+                  <a:solidFill>
+                    <a:srgbClr val="262626"/>
+                  </a:solidFill>
+                  <a:effectLst/>
+                  <a:uLnTx/>
+                  <a:uFillTx/>
+                  <a:latin typeface="Arial"/>
+                  <a:ea typeface="+mn-ea"/>
+                  <a:cs typeface="+mn-cs"/>
+                </a:rPr>
+                <a:t>D </a:t>
+              </a:r>
+            </a:p>
+          </p:txBody>
+        </p:sp>
+        <p:sp>
+          <p:nvSpPr>
+            <p:cNvPr id="76" name="Rounded Rectangle 75">
+              <a:extLst>
+                <a:ext uri="{FF2B5EF4-FFF2-40B4-BE49-F238E27FC236}">
+                  <a16:creationId xmlns:a16="http://schemas.microsoft.com/office/drawing/2014/main" id="{2F7F7B36-6D21-B24A-BEAD-AF6F5B5A24F0}"/>
+                </a:ext>
+              </a:extLst>
+            </p:cNvPr>
+            <p:cNvSpPr/>
+            <p:nvPr/>
+          </p:nvSpPr>
+          <p:spPr>
+            <a:xfrm>
+              <a:off x="6108339" y="4404790"/>
+              <a:ext cx="1152128" cy="288032"/>
+            </a:xfrm>
+            <a:prstGeom prst="roundRect">
+              <a:avLst/>
+            </a:prstGeom>
+            <a:solidFill>
+              <a:srgbClr val="FCDF9E"/>
+            </a:solidFill>
+            <a:ln w="25400" cap="flat" cmpd="sng" algn="ctr">
+              <a:noFill/>
+              <a:prstDash val="solid"/>
+            </a:ln>
+            <a:effectLst/>
+          </p:spPr>
+          <p:txBody>
+            <a:bodyPr rtlCol="0" anchor="ctr"/>
+            <a:lstStyle/>
+            <a:p>
+              <a:pPr marL="0" marR="0" lvl="0" indent="0" algn="ctr" defTabSz="914400" eaLnBrk="1" fontAlgn="auto" latinLnBrk="0" hangingPunct="1">
+                <a:lnSpc>
+                  <a:spcPct val="100000"/>
+                </a:lnSpc>
+                <a:spcBef>
+                  <a:spcPts val="0"/>
+                </a:spcBef>
+                <a:spcAft>
+                  <a:spcPts val="0"/>
+                </a:spcAft>
+                <a:buClrTx/>
+                <a:buSzTx/>
+                <a:buFontTx/>
+                <a:buNone/>
+                <a:tabLst/>
+                <a:defRPr/>
+              </a:pPr>
+              <a:r>
+                <a:rPr kumimoji="0" lang="en-GB" sz="1200" b="0" i="0" u="none" strike="noStrike" kern="0" cap="none" spc="0" normalizeH="0" baseline="0" noProof="0" dirty="0">
+                  <a:ln>
+                    <a:noFill/>
+                  </a:ln>
+                  <a:solidFill>
+                    <a:srgbClr val="262626"/>
+                  </a:solidFill>
+                  <a:effectLst/>
+                  <a:uLnTx/>
+                  <a:uFillTx/>
+                  <a:latin typeface="Arial"/>
+                  <a:ea typeface="+mn-ea"/>
+                  <a:cs typeface="+mn-cs"/>
+                </a:rPr>
+                <a:t>Network </a:t>
+              </a:r>
+              <a:r>
+                <a:rPr kumimoji="0" lang="en-GB" sz="1200" b="0" i="0" u="none" strike="noStrike" kern="0" cap="none" spc="0" normalizeH="0" baseline="0" noProof="0" dirty="0" err="1">
+                  <a:ln>
+                    <a:noFill/>
+                  </a:ln>
+                  <a:solidFill>
+                    <a:srgbClr val="262626"/>
+                  </a:solidFill>
+                  <a:effectLst/>
+                  <a:uLnTx/>
+                  <a:uFillTx/>
+                  <a:latin typeface="Arial"/>
+                  <a:ea typeface="+mn-ea"/>
+                  <a:cs typeface="+mn-cs"/>
+                </a:rPr>
+                <a:t>Acc</a:t>
+              </a:r>
+              <a:r>
+                <a:rPr kumimoji="0" lang="en-GB" sz="1200" b="0" i="0" u="none" strike="noStrike" kern="0" cap="none" spc="0" normalizeH="0" baseline="0" noProof="0" dirty="0">
+                  <a:ln>
+                    <a:noFill/>
+                  </a:ln>
+                  <a:solidFill>
+                    <a:srgbClr val="262626"/>
+                  </a:solidFill>
+                  <a:effectLst/>
+                  <a:uLnTx/>
+                  <a:uFillTx/>
+                  <a:latin typeface="Arial"/>
+                  <a:ea typeface="+mn-ea"/>
+                  <a:cs typeface="+mn-cs"/>
+                </a:rPr>
+                <a:t> </a:t>
+              </a:r>
+            </a:p>
+          </p:txBody>
+        </p:sp>
+        <p:sp>
+          <p:nvSpPr>
+            <p:cNvPr id="77" name="Rounded Rectangle 76">
+              <a:extLst>
+                <a:ext uri="{FF2B5EF4-FFF2-40B4-BE49-F238E27FC236}">
+                  <a16:creationId xmlns:a16="http://schemas.microsoft.com/office/drawing/2014/main" id="{E44E4E1E-B2DD-1B4A-9ECF-46D5A24244B6}"/>
+                </a:ext>
+              </a:extLst>
+            </p:cNvPr>
+            <p:cNvSpPr/>
+            <p:nvPr/>
+          </p:nvSpPr>
+          <p:spPr>
+            <a:xfrm>
+              <a:off x="4882625" y="4412586"/>
+              <a:ext cx="1152128" cy="288032"/>
+            </a:xfrm>
+            <a:prstGeom prst="roundRect">
+              <a:avLst/>
+            </a:prstGeom>
+            <a:solidFill>
+              <a:srgbClr val="FCDF9E"/>
+            </a:solidFill>
+            <a:ln w="25400" cap="flat" cmpd="sng" algn="ctr">
+              <a:noFill/>
+              <a:prstDash val="solid"/>
+            </a:ln>
+            <a:effectLst/>
+          </p:spPr>
+          <p:txBody>
+            <a:bodyPr rtlCol="0" anchor="ctr"/>
+            <a:lstStyle/>
+            <a:p>
+              <a:pPr marL="0" marR="0" lvl="0" indent="0" algn="ctr" defTabSz="914400" eaLnBrk="1" fontAlgn="auto" latinLnBrk="0" hangingPunct="1">
+                <a:lnSpc>
+                  <a:spcPct val="100000"/>
+                </a:lnSpc>
+                <a:spcBef>
+                  <a:spcPts val="0"/>
+                </a:spcBef>
+                <a:spcAft>
+                  <a:spcPts val="0"/>
+                </a:spcAft>
+                <a:buClrTx/>
+                <a:buSzTx/>
+                <a:buFontTx/>
+                <a:buNone/>
+                <a:tabLst/>
+                <a:defRPr/>
+              </a:pPr>
+              <a:r>
+                <a:rPr lang="en-GB" sz="1200" kern="0" dirty="0">
+                  <a:solidFill>
+                    <a:srgbClr val="262626"/>
+                  </a:solidFill>
+                  <a:latin typeface="Arial"/>
+                </a:rPr>
+                <a:t>HW Offloads</a:t>
+              </a:r>
+              <a:r>
+                <a:rPr kumimoji="0" lang="en-GB" sz="1200" b="0" i="0" u="none" strike="noStrike" kern="0" cap="none" spc="0" normalizeH="0" baseline="0" noProof="0" dirty="0">
+                  <a:ln>
+                    <a:noFill/>
+                  </a:ln>
+                  <a:solidFill>
+                    <a:srgbClr val="262626"/>
+                  </a:solidFill>
+                  <a:effectLst/>
+                  <a:uLnTx/>
+                  <a:uFillTx/>
+                  <a:latin typeface="Arial"/>
+                  <a:ea typeface="+mn-ea"/>
+                  <a:cs typeface="+mn-cs"/>
+                </a:rPr>
+                <a:t> </a:t>
+              </a:r>
+            </a:p>
+          </p:txBody>
+        </p:sp>
+      </p:grpSp>
+      <p:grpSp>
+        <p:nvGrpSpPr>
+          <p:cNvPr id="79" name="Group 78">
+            <a:extLst>
+              <a:ext uri="{FF2B5EF4-FFF2-40B4-BE49-F238E27FC236}">
+                <a16:creationId xmlns:a16="http://schemas.microsoft.com/office/drawing/2014/main" id="{F5470228-5F81-524D-96C5-D76F67D83D0A}"/>
+              </a:ext>
+            </a:extLst>
+          </p:cNvPr>
+          <p:cNvGrpSpPr/>
+          <p:nvPr/>
+        </p:nvGrpSpPr>
+        <p:grpSpPr>
+          <a:xfrm>
+            <a:off x="7626339" y="3848519"/>
+            <a:ext cx="2570765" cy="2233828"/>
+            <a:chOff x="4810617" y="3855877"/>
+            <a:chExt cx="2570765" cy="2233828"/>
+          </a:xfrm>
+        </p:grpSpPr>
+        <p:sp>
+          <p:nvSpPr>
+            <p:cNvPr id="80" name="Rounded Rectangle 79">
+              <a:extLst>
+                <a:ext uri="{FF2B5EF4-FFF2-40B4-BE49-F238E27FC236}">
+                  <a16:creationId xmlns:a16="http://schemas.microsoft.com/office/drawing/2014/main" id="{D086A8C7-0004-7F44-ABA9-3C4482D773BE}"/>
+                </a:ext>
+              </a:extLst>
+            </p:cNvPr>
+            <p:cNvSpPr/>
+            <p:nvPr/>
+          </p:nvSpPr>
+          <p:spPr>
+            <a:xfrm>
+              <a:off x="4810617" y="3986784"/>
+              <a:ext cx="2498757" cy="2102921"/>
+            </a:xfrm>
+            <a:prstGeom prst="roundRect">
+              <a:avLst>
+                <a:gd name="adj" fmla="val 7505"/>
+              </a:avLst>
+            </a:prstGeom>
+            <a:solidFill>
+              <a:srgbClr val="5C5C5C">
+                <a:alpha val="50000"/>
+              </a:srgbClr>
+            </a:solidFill>
+            <a:ln>
+              <a:noFill/>
+            </a:ln>
+            <a:effectLst/>
+          </p:spPr>
+          <p:txBody>
+            <a:bodyPr rtlCol="0" anchor="t"/>
+            <a:lstStyle/>
+            <a:p>
+              <a:pPr marL="0" marR="0" lvl="0" indent="0" algn="ctr" defTabSz="914400" eaLnBrk="1" fontAlgn="auto" latinLnBrk="0" hangingPunct="1">
+                <a:lnSpc>
+                  <a:spcPct val="100000"/>
+                </a:lnSpc>
+                <a:spcBef>
+                  <a:spcPts val="0"/>
+                </a:spcBef>
+                <a:spcAft>
+                  <a:spcPts val="0"/>
+                </a:spcAft>
+                <a:buClrTx/>
+                <a:buSzTx/>
+                <a:buFontTx/>
+                <a:buNone/>
+                <a:tabLst/>
+                <a:defRPr/>
+              </a:pPr>
+              <a:r>
+                <a:rPr kumimoji="0" lang="en-GB" sz="1400" b="1" i="0" u="none" strike="noStrike" kern="0" cap="none" spc="0" normalizeH="0" baseline="0" noProof="0" dirty="0">
+                  <a:ln>
+                    <a:noFill/>
+                  </a:ln>
+                  <a:solidFill>
+                    <a:srgbClr val="FFFFFF"/>
+                  </a:solidFill>
+                  <a:effectLst/>
+                  <a:uLnTx/>
+                  <a:uFillTx/>
+                  <a:latin typeface="Arial"/>
+                  <a:ea typeface="+mn-ea"/>
+                  <a:cs typeface="+mn-cs"/>
+                </a:rPr>
+                <a:t>Compute Intensive</a:t>
+              </a:r>
+            </a:p>
+          </p:txBody>
+        </p:sp>
+        <p:pic>
+          <p:nvPicPr>
+            <p:cNvPr id="81" name="Picture 80">
+              <a:extLst>
+                <a:ext uri="{FF2B5EF4-FFF2-40B4-BE49-F238E27FC236}">
+                  <a16:creationId xmlns:a16="http://schemas.microsoft.com/office/drawing/2014/main" id="{EE008E9F-B81D-4945-A0C0-094468E27075}"/>
+                </a:ext>
+              </a:extLst>
+            </p:cNvPr>
+            <p:cNvPicPr>
+              <a:picLocks noChangeAspect="1"/>
+            </p:cNvPicPr>
+            <p:nvPr/>
+          </p:nvPicPr>
+          <p:blipFill>
+            <a:blip r:embed="rId2" cstate="print">
+              <a:extLst>
+                <a:ext uri="{28A0092B-C50C-407E-A947-70E740481C1C}">
+                  <a14:useLocalDpi xmlns:a14="http://schemas.microsoft.com/office/drawing/2010/main" val="0"/>
+                </a:ext>
+              </a:extLst>
+            </a:blip>
+            <a:stretch>
+              <a:fillRect/>
+            </a:stretch>
+          </p:blipFill>
+          <p:spPr>
+            <a:xfrm>
+              <a:off x="6937503" y="3855877"/>
+              <a:ext cx="443879" cy="438637"/>
+            </a:xfrm>
+            <a:prstGeom prst="rect">
+              <a:avLst/>
+            </a:prstGeom>
+          </p:spPr>
+        </p:pic>
+        <p:sp>
+          <p:nvSpPr>
+            <p:cNvPr id="82" name="Rounded Rectangle 81">
+              <a:extLst>
+                <a:ext uri="{FF2B5EF4-FFF2-40B4-BE49-F238E27FC236}">
+                  <a16:creationId xmlns:a16="http://schemas.microsoft.com/office/drawing/2014/main" id="{9C5497C0-B043-D34A-835B-42A3720DAD3B}"/>
+                </a:ext>
+              </a:extLst>
+            </p:cNvPr>
+            <p:cNvSpPr/>
+            <p:nvPr/>
+          </p:nvSpPr>
+          <p:spPr>
+            <a:xfrm>
+              <a:off x="4882625" y="5420921"/>
+              <a:ext cx="1152128" cy="288032"/>
+            </a:xfrm>
+            <a:prstGeom prst="roundRect">
+              <a:avLst/>
+            </a:prstGeom>
+            <a:solidFill>
+              <a:srgbClr val="FCDF9E"/>
+            </a:solidFill>
+            <a:ln w="25400" cap="flat" cmpd="sng" algn="ctr">
+              <a:noFill/>
+              <a:prstDash val="solid"/>
+            </a:ln>
+            <a:effectLst/>
+          </p:spPr>
+          <p:txBody>
+            <a:bodyPr rtlCol="0" anchor="ctr"/>
+            <a:lstStyle/>
+            <a:p>
+              <a:pPr marL="0" marR="0" lvl="0" indent="0" algn="ctr" defTabSz="914400" eaLnBrk="1" fontAlgn="auto" latinLnBrk="0" hangingPunct="1">
+                <a:lnSpc>
+                  <a:spcPct val="100000"/>
+                </a:lnSpc>
+                <a:spcBef>
+                  <a:spcPts val="0"/>
+                </a:spcBef>
+                <a:spcAft>
+                  <a:spcPts val="0"/>
+                </a:spcAft>
+                <a:buClrTx/>
+                <a:buSzTx/>
+                <a:buFontTx/>
+                <a:buNone/>
+                <a:tabLst/>
+                <a:defRPr/>
+              </a:pPr>
+              <a:r>
+                <a:rPr kumimoji="0" lang="en-GB" sz="1200" b="0" i="0" u="none" strike="noStrike" kern="0" cap="none" spc="0" normalizeH="0" baseline="0" noProof="0" dirty="0">
+                  <a:ln>
+                    <a:noFill/>
+                  </a:ln>
+                  <a:solidFill>
+                    <a:srgbClr val="262626"/>
+                  </a:solidFill>
+                  <a:effectLst/>
+                  <a:uLnTx/>
+                  <a:uFillTx/>
+                  <a:latin typeface="Arial"/>
+                  <a:ea typeface="+mn-ea"/>
+                  <a:cs typeface="+mn-cs"/>
+                </a:rPr>
+                <a:t>SMT/HT</a:t>
+              </a:r>
+            </a:p>
+          </p:txBody>
+        </p:sp>
+        <p:sp>
+          <p:nvSpPr>
+            <p:cNvPr id="83" name="Rounded Rectangle 82">
+              <a:extLst>
+                <a:ext uri="{FF2B5EF4-FFF2-40B4-BE49-F238E27FC236}">
+                  <a16:creationId xmlns:a16="http://schemas.microsoft.com/office/drawing/2014/main" id="{871DD8DC-86F3-2D47-8F69-6DC65900927C}"/>
+                </a:ext>
+              </a:extLst>
+            </p:cNvPr>
+            <p:cNvSpPr/>
+            <p:nvPr/>
+          </p:nvSpPr>
+          <p:spPr>
+            <a:xfrm>
+              <a:off x="6095999" y="5420921"/>
+              <a:ext cx="1152128" cy="288032"/>
+            </a:xfrm>
+            <a:prstGeom prst="roundRect">
+              <a:avLst/>
+            </a:prstGeom>
+            <a:solidFill>
+              <a:srgbClr val="FCDF9E"/>
+            </a:solidFill>
+            <a:ln w="25400" cap="flat" cmpd="sng" algn="ctr">
+              <a:noFill/>
+              <a:prstDash val="solid"/>
+            </a:ln>
+            <a:effectLst/>
+          </p:spPr>
+          <p:txBody>
+            <a:bodyPr rtlCol="0" anchor="ctr"/>
+            <a:lstStyle/>
+            <a:p>
+              <a:pPr marL="0" marR="0" lvl="0" indent="0" algn="ctr" defTabSz="914400" eaLnBrk="1" fontAlgn="auto" latinLnBrk="0" hangingPunct="1">
+                <a:lnSpc>
+                  <a:spcPct val="100000"/>
+                </a:lnSpc>
+                <a:spcBef>
+                  <a:spcPts val="0"/>
+                </a:spcBef>
+                <a:spcAft>
+                  <a:spcPts val="0"/>
+                </a:spcAft>
+                <a:buClrTx/>
+                <a:buSzTx/>
+                <a:buFontTx/>
+                <a:buNone/>
+                <a:tabLst/>
+                <a:defRPr/>
+              </a:pPr>
+              <a:r>
+                <a:rPr lang="en-GB" sz="1200" kern="0" dirty="0">
+                  <a:solidFill>
+                    <a:srgbClr val="262626"/>
+                  </a:solidFill>
+                  <a:latin typeface="Arial"/>
+                </a:rPr>
+                <a:t>PCIe</a:t>
+              </a:r>
+              <a:endParaRPr kumimoji="0" lang="en-GB" sz="1200" b="0" i="0" u="none" strike="noStrike" kern="0" cap="none" spc="0" normalizeH="0" baseline="0" noProof="0" dirty="0">
+                <a:ln>
+                  <a:noFill/>
+                </a:ln>
+                <a:solidFill>
+                  <a:srgbClr val="262626"/>
+                </a:solidFill>
+                <a:effectLst/>
+                <a:uLnTx/>
+                <a:uFillTx/>
+                <a:latin typeface="Arial"/>
+                <a:ea typeface="+mn-ea"/>
+                <a:cs typeface="+mn-cs"/>
+              </a:endParaRPr>
+            </a:p>
+          </p:txBody>
+        </p:sp>
+        <p:sp>
+          <p:nvSpPr>
+            <p:cNvPr id="84" name="Rounded Rectangle 83">
+              <a:extLst>
+                <a:ext uri="{FF2B5EF4-FFF2-40B4-BE49-F238E27FC236}">
+                  <a16:creationId xmlns:a16="http://schemas.microsoft.com/office/drawing/2014/main" id="{2E2BA77C-D6F8-9D45-A322-AA0F550002A5}"/>
+                </a:ext>
+              </a:extLst>
+            </p:cNvPr>
+            <p:cNvSpPr/>
+            <p:nvPr/>
+          </p:nvSpPr>
+          <p:spPr>
+            <a:xfrm>
+              <a:off x="6095999" y="5080378"/>
+              <a:ext cx="1152128" cy="288032"/>
+            </a:xfrm>
+            <a:prstGeom prst="roundRect">
+              <a:avLst/>
+            </a:prstGeom>
+            <a:solidFill>
+              <a:srgbClr val="FCDF9E"/>
+            </a:solidFill>
+            <a:ln w="25400" cap="flat" cmpd="sng" algn="ctr">
+              <a:noFill/>
+              <a:prstDash val="solid"/>
+            </a:ln>
+            <a:effectLst/>
+          </p:spPr>
+          <p:txBody>
+            <a:bodyPr rtlCol="0" anchor="ctr"/>
+            <a:lstStyle/>
+            <a:p>
+              <a:pPr marL="0" marR="0" lvl="0" indent="0" algn="ctr" defTabSz="914400" eaLnBrk="1" fontAlgn="auto" latinLnBrk="0" hangingPunct="1">
+                <a:lnSpc>
+                  <a:spcPct val="100000"/>
+                </a:lnSpc>
+                <a:spcBef>
+                  <a:spcPts val="0"/>
+                </a:spcBef>
+                <a:spcAft>
+                  <a:spcPts val="0"/>
+                </a:spcAft>
+                <a:buClrTx/>
+                <a:buSzTx/>
+                <a:buFontTx/>
+                <a:buNone/>
+                <a:tabLst/>
+                <a:defRPr/>
+              </a:pPr>
+              <a:r>
+                <a:rPr lang="en-GB" sz="1200" kern="0" dirty="0">
+                  <a:solidFill>
+                    <a:srgbClr val="262626"/>
+                  </a:solidFill>
+                  <a:latin typeface="Arial"/>
+                </a:rPr>
+                <a:t>#NIC</a:t>
+              </a:r>
+              <a:endParaRPr kumimoji="0" lang="en-GB" sz="1200" b="0" i="0" u="none" strike="noStrike" kern="0" cap="none" spc="0" normalizeH="0" baseline="0" noProof="0" dirty="0">
+                <a:ln>
+                  <a:noFill/>
+                </a:ln>
+                <a:solidFill>
+                  <a:srgbClr val="262626"/>
+                </a:solidFill>
+                <a:effectLst/>
+                <a:uLnTx/>
+                <a:uFillTx/>
+                <a:latin typeface="Arial"/>
+                <a:ea typeface="+mn-ea"/>
+                <a:cs typeface="+mn-cs"/>
+              </a:endParaRPr>
+            </a:p>
+          </p:txBody>
+        </p:sp>
+        <p:sp>
+          <p:nvSpPr>
+            <p:cNvPr id="85" name="Rounded Rectangle 84">
+              <a:extLst>
+                <a:ext uri="{FF2B5EF4-FFF2-40B4-BE49-F238E27FC236}">
+                  <a16:creationId xmlns:a16="http://schemas.microsoft.com/office/drawing/2014/main" id="{9DB8B793-F70F-5D4A-A83C-76F20DC98FD0}"/>
+                </a:ext>
+              </a:extLst>
+            </p:cNvPr>
+            <p:cNvSpPr/>
+            <p:nvPr/>
+          </p:nvSpPr>
+          <p:spPr>
+            <a:xfrm>
+              <a:off x="6108339" y="4737575"/>
+              <a:ext cx="1152128" cy="288032"/>
+            </a:xfrm>
+            <a:prstGeom prst="roundRect">
+              <a:avLst/>
+            </a:prstGeom>
+            <a:solidFill>
+              <a:srgbClr val="FCDF9E"/>
+            </a:solidFill>
+            <a:ln w="25400" cap="flat" cmpd="sng" algn="ctr">
+              <a:noFill/>
+              <a:prstDash val="solid"/>
+            </a:ln>
+            <a:effectLst/>
+          </p:spPr>
+          <p:txBody>
+            <a:bodyPr rtlCol="0" anchor="ctr"/>
+            <a:lstStyle/>
+            <a:p>
+              <a:pPr marL="0" marR="0" lvl="0" indent="0" algn="ctr" defTabSz="914400" eaLnBrk="1" fontAlgn="auto" latinLnBrk="0" hangingPunct="1">
+                <a:lnSpc>
+                  <a:spcPct val="100000"/>
+                </a:lnSpc>
+                <a:spcBef>
+                  <a:spcPts val="0"/>
+                </a:spcBef>
+                <a:spcAft>
+                  <a:spcPts val="0"/>
+                </a:spcAft>
+                <a:buClrTx/>
+                <a:buSzTx/>
+                <a:buFontTx/>
+                <a:buNone/>
+                <a:tabLst/>
+                <a:defRPr/>
+              </a:pPr>
+              <a:r>
+                <a:rPr kumimoji="0" lang="en-GB" sz="1200" b="0" i="0" u="none" strike="noStrike" kern="0" cap="none" spc="0" normalizeH="0" baseline="0" noProof="0" dirty="0">
+                  <a:ln>
+                    <a:noFill/>
+                  </a:ln>
+                  <a:solidFill>
+                    <a:srgbClr val="262626"/>
+                  </a:solidFill>
+                  <a:effectLst/>
+                  <a:uLnTx/>
+                  <a:uFillTx/>
+                  <a:latin typeface="Arial"/>
+                  <a:ea typeface="+mn-ea"/>
+                  <a:cs typeface="+mn-cs"/>
+                </a:rPr>
+                <a:t>SSD </a:t>
+              </a:r>
+            </a:p>
+          </p:txBody>
+        </p:sp>
+        <p:sp>
+          <p:nvSpPr>
+            <p:cNvPr id="119" name="Rounded Rectangle 118">
+              <a:extLst>
+                <a:ext uri="{FF2B5EF4-FFF2-40B4-BE49-F238E27FC236}">
+                  <a16:creationId xmlns:a16="http://schemas.microsoft.com/office/drawing/2014/main" id="{79B8A91A-80EB-0240-9244-315FBF994739}"/>
+                </a:ext>
+              </a:extLst>
+            </p:cNvPr>
+            <p:cNvSpPr/>
+            <p:nvPr/>
+          </p:nvSpPr>
+          <p:spPr>
+            <a:xfrm>
+              <a:off x="4882625" y="5772811"/>
+              <a:ext cx="1152128" cy="288032"/>
+            </a:xfrm>
+            <a:prstGeom prst="roundRect">
+              <a:avLst/>
+            </a:prstGeom>
+            <a:solidFill>
+              <a:srgbClr val="FCDF9E"/>
+            </a:solidFill>
+            <a:ln w="25400" cap="flat" cmpd="sng" algn="ctr">
+              <a:noFill/>
+              <a:prstDash val="solid"/>
+            </a:ln>
+            <a:effectLst/>
+          </p:spPr>
+          <p:txBody>
+            <a:bodyPr rtlCol="0" anchor="ctr"/>
+            <a:lstStyle/>
+            <a:p>
+              <a:pPr marL="0" marR="0" lvl="0" indent="0" algn="ctr" defTabSz="914400" eaLnBrk="1" fontAlgn="auto" latinLnBrk="0" hangingPunct="1">
+                <a:lnSpc>
+                  <a:spcPct val="100000"/>
+                </a:lnSpc>
+                <a:spcBef>
+                  <a:spcPts val="0"/>
+                </a:spcBef>
+                <a:spcAft>
+                  <a:spcPts val="0"/>
+                </a:spcAft>
+                <a:buClrTx/>
+                <a:buSzTx/>
+                <a:buFontTx/>
+                <a:buNone/>
+                <a:tabLst/>
+                <a:defRPr/>
+              </a:pPr>
+              <a:r>
+                <a:rPr kumimoji="0" lang="en-GB" sz="1200" b="0" i="0" u="none" strike="noStrike" kern="0" cap="none" spc="0" normalizeH="0" baseline="0" noProof="0" dirty="0">
+                  <a:ln>
+                    <a:noFill/>
+                  </a:ln>
+                  <a:solidFill>
+                    <a:srgbClr val="262626"/>
+                  </a:solidFill>
+                  <a:effectLst/>
+                  <a:uLnTx/>
+                  <a:uFillTx/>
+                  <a:latin typeface="Arial"/>
+                  <a:ea typeface="+mn-ea"/>
+                  <a:cs typeface="+mn-cs"/>
+                </a:rPr>
+                <a:t>#CPU</a:t>
+              </a:r>
+            </a:p>
+          </p:txBody>
+        </p:sp>
+        <p:sp>
+          <p:nvSpPr>
+            <p:cNvPr id="120" name="Rounded Rectangle 119">
+              <a:extLst>
+                <a:ext uri="{FF2B5EF4-FFF2-40B4-BE49-F238E27FC236}">
+                  <a16:creationId xmlns:a16="http://schemas.microsoft.com/office/drawing/2014/main" id="{B4B8AEAD-D256-D445-AB1B-CF8BEAB7CF0E}"/>
+                </a:ext>
+              </a:extLst>
+            </p:cNvPr>
+            <p:cNvSpPr/>
+            <p:nvPr/>
+          </p:nvSpPr>
+          <p:spPr>
+            <a:xfrm>
+              <a:off x="6095999" y="5761464"/>
+              <a:ext cx="1152128" cy="288032"/>
+            </a:xfrm>
+            <a:prstGeom prst="roundRect">
+              <a:avLst/>
+            </a:prstGeom>
+            <a:solidFill>
+              <a:srgbClr val="FCDF9E"/>
+            </a:solidFill>
+            <a:ln w="25400" cap="flat" cmpd="sng" algn="ctr">
+              <a:noFill/>
+              <a:prstDash val="solid"/>
+            </a:ln>
+            <a:effectLst/>
+          </p:spPr>
+          <p:txBody>
+            <a:bodyPr rtlCol="0" anchor="ctr"/>
+            <a:lstStyle/>
+            <a:p>
+              <a:pPr marL="0" marR="0" lvl="0" indent="0" algn="ctr" defTabSz="914400" eaLnBrk="1" fontAlgn="auto" latinLnBrk="0" hangingPunct="1">
+                <a:lnSpc>
+                  <a:spcPct val="100000"/>
+                </a:lnSpc>
+                <a:spcBef>
+                  <a:spcPts val="0"/>
+                </a:spcBef>
+                <a:spcAft>
+                  <a:spcPts val="0"/>
+                </a:spcAft>
+                <a:buClrTx/>
+                <a:buSzTx/>
+                <a:buFontTx/>
+                <a:buNone/>
+                <a:tabLst/>
+                <a:defRPr/>
+              </a:pPr>
+              <a:r>
+                <a:rPr kumimoji="0" lang="en-GB" sz="1200" b="0" i="0" u="none" strike="noStrike" kern="0" cap="none" spc="0" normalizeH="0" baseline="0" noProof="0" dirty="0">
+                  <a:ln>
+                    <a:noFill/>
+                  </a:ln>
+                  <a:solidFill>
+                    <a:srgbClr val="262626"/>
+                  </a:solidFill>
+                  <a:effectLst/>
+                  <a:uLnTx/>
+                  <a:uFillTx/>
+                  <a:latin typeface="Arial"/>
+                  <a:ea typeface="+mn-ea"/>
+                  <a:cs typeface="+mn-cs"/>
+                </a:rPr>
+                <a:t>#Cores</a:t>
+              </a:r>
+            </a:p>
+          </p:txBody>
+        </p:sp>
+        <p:sp>
+          <p:nvSpPr>
+            <p:cNvPr id="121" name="Rounded Rectangle 120">
+              <a:extLst>
+                <a:ext uri="{FF2B5EF4-FFF2-40B4-BE49-F238E27FC236}">
+                  <a16:creationId xmlns:a16="http://schemas.microsoft.com/office/drawing/2014/main" id="{789A28A6-AA31-DB4F-962C-C978AA091EE6}"/>
+                </a:ext>
+              </a:extLst>
+            </p:cNvPr>
+            <p:cNvSpPr/>
+            <p:nvPr/>
+          </p:nvSpPr>
+          <p:spPr>
+            <a:xfrm>
+              <a:off x="4882625" y="5085826"/>
+              <a:ext cx="1152128" cy="288032"/>
+            </a:xfrm>
+            <a:prstGeom prst="roundRect">
+              <a:avLst/>
+            </a:prstGeom>
+            <a:solidFill>
+              <a:srgbClr val="FCDF9E"/>
+            </a:solidFill>
+            <a:ln w="25400" cap="flat" cmpd="sng" algn="ctr">
+              <a:noFill/>
+              <a:prstDash val="solid"/>
+            </a:ln>
+            <a:effectLst/>
+          </p:spPr>
+          <p:txBody>
+            <a:bodyPr rtlCol="0" anchor="ctr"/>
+            <a:lstStyle/>
+            <a:p>
+              <a:pPr marL="0" marR="0" lvl="0" indent="0" algn="ctr" defTabSz="914400" eaLnBrk="1" fontAlgn="auto" latinLnBrk="0" hangingPunct="1">
+                <a:lnSpc>
+                  <a:spcPct val="100000"/>
+                </a:lnSpc>
+                <a:spcBef>
+                  <a:spcPts val="0"/>
+                </a:spcBef>
+                <a:spcAft>
+                  <a:spcPts val="0"/>
+                </a:spcAft>
+                <a:buClrTx/>
+                <a:buSzTx/>
+                <a:buFontTx/>
+                <a:buNone/>
+                <a:tabLst/>
+                <a:defRPr/>
+              </a:pPr>
+              <a:r>
+                <a:rPr kumimoji="0" lang="en-GB" sz="1200" b="0" i="0" u="none" strike="noStrike" kern="0" cap="none" spc="0" normalizeH="0" baseline="0" noProof="0" dirty="0">
+                  <a:ln>
+                    <a:noFill/>
+                  </a:ln>
+                  <a:solidFill>
+                    <a:srgbClr val="262626"/>
+                  </a:solidFill>
+                  <a:effectLst/>
+                  <a:uLnTx/>
+                  <a:uFillTx/>
+                  <a:latin typeface="Arial"/>
+                  <a:ea typeface="+mn-ea"/>
+                  <a:cs typeface="+mn-cs"/>
+                </a:rPr>
+                <a:t>RAM(GB)</a:t>
+              </a:r>
+            </a:p>
+          </p:txBody>
+        </p:sp>
+        <p:sp>
+          <p:nvSpPr>
+            <p:cNvPr id="122" name="Rounded Rectangle 121">
+              <a:extLst>
+                <a:ext uri="{FF2B5EF4-FFF2-40B4-BE49-F238E27FC236}">
+                  <a16:creationId xmlns:a16="http://schemas.microsoft.com/office/drawing/2014/main" id="{4909F6C9-42FC-7245-821E-3E2AA7C64547}"/>
+                </a:ext>
+              </a:extLst>
+            </p:cNvPr>
+            <p:cNvSpPr/>
+            <p:nvPr/>
+          </p:nvSpPr>
+          <p:spPr>
+            <a:xfrm>
+              <a:off x="4882625" y="4745371"/>
+              <a:ext cx="1152128" cy="288032"/>
+            </a:xfrm>
+            <a:prstGeom prst="roundRect">
+              <a:avLst/>
+            </a:prstGeom>
+            <a:solidFill>
+              <a:srgbClr val="FCDF9E"/>
+            </a:solidFill>
+            <a:ln w="25400" cap="flat" cmpd="sng" algn="ctr">
+              <a:noFill/>
+              <a:prstDash val="solid"/>
+            </a:ln>
+            <a:effectLst/>
+          </p:spPr>
+          <p:txBody>
+            <a:bodyPr rtlCol="0" anchor="ctr"/>
+            <a:lstStyle/>
+            <a:p>
+              <a:pPr marL="0" marR="0" lvl="0" indent="0" algn="ctr" defTabSz="914400" eaLnBrk="1" fontAlgn="auto" latinLnBrk="0" hangingPunct="1">
+                <a:lnSpc>
+                  <a:spcPct val="100000"/>
+                </a:lnSpc>
+                <a:spcBef>
+                  <a:spcPts val="0"/>
+                </a:spcBef>
+                <a:spcAft>
+                  <a:spcPts val="0"/>
+                </a:spcAft>
+                <a:buClrTx/>
+                <a:buSzTx/>
+                <a:buFontTx/>
+                <a:buNone/>
+                <a:tabLst/>
+                <a:defRPr/>
+              </a:pPr>
+              <a:r>
+                <a:rPr lang="en-GB" sz="1200" kern="0" dirty="0">
+                  <a:solidFill>
+                    <a:srgbClr val="262626"/>
+                  </a:solidFill>
+                  <a:latin typeface="Arial"/>
+                </a:rPr>
+                <a:t>HD</a:t>
+              </a:r>
+              <a:r>
+                <a:rPr kumimoji="0" lang="en-GB" sz="1200" b="0" i="0" u="none" strike="noStrike" kern="0" cap="none" spc="0" normalizeH="0" baseline="0" noProof="0" dirty="0">
+                  <a:ln>
+                    <a:noFill/>
+                  </a:ln>
+                  <a:solidFill>
+                    <a:srgbClr val="262626"/>
+                  </a:solidFill>
+                  <a:effectLst/>
+                  <a:uLnTx/>
+                  <a:uFillTx/>
+                  <a:latin typeface="Arial"/>
+                  <a:ea typeface="+mn-ea"/>
+                  <a:cs typeface="+mn-cs"/>
+                </a:rPr>
+                <a:t>D </a:t>
+              </a:r>
+            </a:p>
+          </p:txBody>
+        </p:sp>
+        <p:sp>
+          <p:nvSpPr>
+            <p:cNvPr id="123" name="Rounded Rectangle 122">
+              <a:extLst>
+                <a:ext uri="{FF2B5EF4-FFF2-40B4-BE49-F238E27FC236}">
+                  <a16:creationId xmlns:a16="http://schemas.microsoft.com/office/drawing/2014/main" id="{C2E511A2-7191-8148-BAB3-8B7FAEFAC1C7}"/>
+                </a:ext>
+              </a:extLst>
+            </p:cNvPr>
+            <p:cNvSpPr/>
+            <p:nvPr/>
+          </p:nvSpPr>
+          <p:spPr>
+            <a:xfrm>
+              <a:off x="6108339" y="4404790"/>
+              <a:ext cx="1152128" cy="288032"/>
+            </a:xfrm>
+            <a:prstGeom prst="roundRect">
+              <a:avLst/>
+            </a:prstGeom>
+            <a:solidFill>
+              <a:srgbClr val="FCDF9E"/>
+            </a:solidFill>
+            <a:ln w="25400" cap="flat" cmpd="sng" algn="ctr">
+              <a:noFill/>
+              <a:prstDash val="solid"/>
+            </a:ln>
+            <a:effectLst/>
+          </p:spPr>
+          <p:txBody>
+            <a:bodyPr rtlCol="0" anchor="ctr"/>
+            <a:lstStyle/>
+            <a:p>
+              <a:pPr marL="0" marR="0" lvl="0" indent="0" algn="ctr" defTabSz="914400" eaLnBrk="1" fontAlgn="auto" latinLnBrk="0" hangingPunct="1">
+                <a:lnSpc>
+                  <a:spcPct val="100000"/>
+                </a:lnSpc>
+                <a:spcBef>
+                  <a:spcPts val="0"/>
+                </a:spcBef>
+                <a:spcAft>
+                  <a:spcPts val="0"/>
+                </a:spcAft>
+                <a:buClrTx/>
+                <a:buSzTx/>
+                <a:buFontTx/>
+                <a:buNone/>
+                <a:tabLst/>
+                <a:defRPr/>
+              </a:pPr>
+              <a:r>
+                <a:rPr kumimoji="0" lang="en-GB" sz="1200" b="0" i="0" u="none" strike="noStrike" kern="0" cap="none" spc="0" normalizeH="0" baseline="0" noProof="0" dirty="0">
+                  <a:ln>
+                    <a:noFill/>
+                  </a:ln>
+                  <a:solidFill>
+                    <a:srgbClr val="262626"/>
+                  </a:solidFill>
+                  <a:effectLst/>
+                  <a:uLnTx/>
+                  <a:uFillTx/>
+                  <a:latin typeface="Arial"/>
+                  <a:ea typeface="+mn-ea"/>
+                  <a:cs typeface="+mn-cs"/>
+                </a:rPr>
+                <a:t>FPGA/GPU</a:t>
+              </a:r>
+            </a:p>
+          </p:txBody>
+        </p:sp>
+        <p:sp>
+          <p:nvSpPr>
+            <p:cNvPr id="124" name="Rounded Rectangle 123">
+              <a:extLst>
+                <a:ext uri="{FF2B5EF4-FFF2-40B4-BE49-F238E27FC236}">
+                  <a16:creationId xmlns:a16="http://schemas.microsoft.com/office/drawing/2014/main" id="{F9EA8F84-BE9F-774D-B203-B661AC8E7128}"/>
+                </a:ext>
+              </a:extLst>
+            </p:cNvPr>
+            <p:cNvSpPr/>
+            <p:nvPr/>
+          </p:nvSpPr>
+          <p:spPr>
+            <a:xfrm>
+              <a:off x="4882625" y="4412586"/>
+              <a:ext cx="1152128" cy="288032"/>
+            </a:xfrm>
+            <a:prstGeom prst="roundRect">
+              <a:avLst/>
+            </a:prstGeom>
+            <a:solidFill>
+              <a:srgbClr val="FCDF9E"/>
+            </a:solidFill>
+            <a:ln w="25400" cap="flat" cmpd="sng" algn="ctr">
+              <a:noFill/>
+              <a:prstDash val="solid"/>
+            </a:ln>
+            <a:effectLst/>
+          </p:spPr>
+          <p:txBody>
+            <a:bodyPr rtlCol="0" anchor="ctr"/>
+            <a:lstStyle/>
+            <a:p>
+              <a:pPr marL="0" marR="0" lvl="0" indent="0" algn="ctr" defTabSz="914400" eaLnBrk="1" fontAlgn="auto" latinLnBrk="0" hangingPunct="1">
+                <a:lnSpc>
+                  <a:spcPct val="100000"/>
+                </a:lnSpc>
+                <a:spcBef>
+                  <a:spcPts val="0"/>
+                </a:spcBef>
+                <a:spcAft>
+                  <a:spcPts val="0"/>
+                </a:spcAft>
+                <a:buClrTx/>
+                <a:buSzTx/>
+                <a:buFontTx/>
+                <a:buNone/>
+                <a:tabLst/>
+                <a:defRPr/>
+              </a:pPr>
+              <a:r>
+                <a:rPr lang="en-GB" sz="1200" kern="0" dirty="0">
+                  <a:solidFill>
+                    <a:srgbClr val="262626"/>
+                  </a:solidFill>
+                  <a:latin typeface="Arial"/>
+                </a:rPr>
+                <a:t>HW Offloads</a:t>
+              </a:r>
+              <a:r>
+                <a:rPr kumimoji="0" lang="en-GB" sz="1200" b="0" i="0" u="none" strike="noStrike" kern="0" cap="none" spc="0" normalizeH="0" baseline="0" noProof="0" dirty="0">
+                  <a:ln>
+                    <a:noFill/>
+                  </a:ln>
+                  <a:solidFill>
+                    <a:srgbClr val="262626"/>
+                  </a:solidFill>
+                  <a:effectLst/>
+                  <a:uLnTx/>
+                  <a:uFillTx/>
+                  <a:latin typeface="Arial"/>
+                  <a:ea typeface="+mn-ea"/>
+                  <a:cs typeface="+mn-cs"/>
+                </a:rPr>
+                <a:t> </a:t>
+              </a:r>
+            </a:p>
+          </p:txBody>
+        </p:sp>
+      </p:grpSp>
+    </p:spTree>
+    <p:extLst>
+      <p:ext uri="{BB962C8B-B14F-4D97-AF65-F5344CB8AC3E}">
+        <p14:creationId xmlns:p14="http://schemas.microsoft.com/office/powerpoint/2010/main" val="1188196551"/>
+      </p:ext>
+    </p:extLst>
+  </p:cSld>
+  <p:clrMapOvr>
+    <a:masterClrMapping/>
+  </p:clrMapOvr>
+</p:sld>
+</file>
+
+<file path=ppt/slides/slide13.xml><?xml version="1.0" encoding="utf-8"?>
+<p:sld xmlns:a="http://schemas.openxmlformats.org/drawingml/2006/main" xmlns:r="http://schemas.openxmlformats.org/officeDocument/2006/relationships" xmlns:p="http://schemas.openxmlformats.org/presentationml/2006/main">
+  <p:cSld>
+    <p:spTree>
+      <p:nvGrpSpPr>
+        <p:cNvPr id="1" name=""/>
+        <p:cNvGrpSpPr/>
+        <p:nvPr/>
+      </p:nvGrpSpPr>
+      <p:grpSpPr>
+        <a:xfrm>
+          <a:off x="0" y="0"/>
+          <a:ext cx="0" cy="0"/>
+          <a:chOff x="0" y="0"/>
+          <a:chExt cx="0" cy="0"/>
+        </a:xfrm>
+      </p:grpSpPr>
       <p:pic>
         <p:nvPicPr>
           <p:cNvPr id="21" name="Picture 20"/>
@@ -15983,7 +18519,7 @@
 </p:sld>
 </file>
 
-<file path=ppt/slides/slide13.xml><?xml version="1.0" encoding="utf-8"?>
+<file path=ppt/slides/slide14.xml><?xml version="1.0" encoding="utf-8"?>
 <p:sld xmlns:a="http://schemas.openxmlformats.org/drawingml/2006/main" xmlns:r="http://schemas.openxmlformats.org/officeDocument/2006/relationships" xmlns:p="http://schemas.openxmlformats.org/presentationml/2006/main">
   <p:cSld>
     <p:spTree>
@@ -17508,7 +20044,7 @@
 </p:sld>
 </file>
 
-<file path=ppt/slides/slide14.xml><?xml version="1.0" encoding="utf-8"?>
+<file path=ppt/slides/slide15.xml><?xml version="1.0" encoding="utf-8"?>
 <p:sld xmlns:a="http://schemas.openxmlformats.org/drawingml/2006/main" xmlns:r="http://schemas.openxmlformats.org/officeDocument/2006/relationships" xmlns:p="http://schemas.openxmlformats.org/presentationml/2006/main">
   <p:cSld>
     <p:spTree>
@@ -18749,7 +21285,7 @@
 </p:sld>
 </file>
 
-<file path=ppt/slides/slide15.xml><?xml version="1.0" encoding="utf-8"?>
+<file path=ppt/slides/slide16.xml><?xml version="1.0" encoding="utf-8"?>
 <p:sld xmlns:a="http://schemas.openxmlformats.org/drawingml/2006/main" xmlns:r="http://schemas.openxmlformats.org/officeDocument/2006/relationships" xmlns:p="http://schemas.openxmlformats.org/presentationml/2006/main">
   <p:cSld>
     <p:spTree>
@@ -20712,7 +23248,7 @@
 </p:sld>
 </file>
 
-<file path=ppt/slides/slide16.xml><?xml version="1.0" encoding="utf-8"?>
+<file path=ppt/slides/slide17.xml><?xml version="1.0" encoding="utf-8"?>
 <p:sld xmlns:a="http://schemas.openxmlformats.org/drawingml/2006/main" xmlns:r="http://schemas.openxmlformats.org/officeDocument/2006/relationships" xmlns:p="http://schemas.openxmlformats.org/presentationml/2006/main">
   <p:cSld>
     <p:spTree>
@@ -22329,7 +24865,7 @@
 </p:sld>
 </file>
 
-<file path=ppt/slides/slide17.xml><?xml version="1.0" encoding="utf-8"?>
+<file path=ppt/slides/slide18.xml><?xml version="1.0" encoding="utf-8"?>
 <p:sld xmlns:a="http://schemas.openxmlformats.org/drawingml/2006/main" xmlns:r="http://schemas.openxmlformats.org/officeDocument/2006/relationships" xmlns:p="http://schemas.openxmlformats.org/presentationml/2006/main">
   <p:cSld>
     <p:spTree>
@@ -23194,7 +25730,7 @@
 </p:sld>
 </file>
 
-<file path=ppt/slides/slide18.xml><?xml version="1.0" encoding="utf-8"?>
+<file path=ppt/slides/slide19.xml><?xml version="1.0" encoding="utf-8"?>
 <p:sld xmlns:a="http://schemas.openxmlformats.org/drawingml/2006/main" xmlns:r="http://schemas.openxmlformats.org/officeDocument/2006/relationships" xmlns:p="http://schemas.openxmlformats.org/presentationml/2006/main">
   <p:cSld>
     <p:spTree>

</xml_diff>